<commit_message>
Adds slide for final solution example
</commit_message>
<xml_diff>
--- a/src/Assets/GAB2018 - Diagrams.pptx
+++ b/src/Assets/GAB2018 - Diagrams.pptx
@@ -5,13 +5,14 @@
     <p:sldMasterId id="2147483648" r:id="rId1"/>
   </p:sldMasterIdLst>
   <p:notesMasterIdLst>
-    <p:notesMasterId r:id="rId6"/>
+    <p:notesMasterId r:id="rId7"/>
   </p:notesMasterIdLst>
   <p:sldIdLst>
     <p:sldId id="257" r:id="rId2"/>
     <p:sldId id="259" r:id="rId3"/>
     <p:sldId id="260" r:id="rId4"/>
     <p:sldId id="258" r:id="rId5"/>
+    <p:sldId id="261" r:id="rId6"/>
   </p:sldIdLst>
   <p:sldSz cx="12192000" cy="6858000"/>
   <p:notesSz cx="6858000" cy="9144000"/>
@@ -211,7 +212,7 @@
           <a:p>
             <a:fld id="{D731FBDC-41BC-4FDB-B806-CF8847D64564}" type="datetimeFigureOut">
               <a:rPr lang="nb-NO" smtClean="0"/>
-              <a:t>02.04.2018</a:t>
+              <a:t>20.04.2018</a:t>
             </a:fld>
             <a:endParaRPr lang="nb-NO"/>
           </a:p>
@@ -996,6 +997,90 @@
 </p:notes>
 </file>
 
+<file path=ppt/notesSlides/notesSlide4.xml><?xml version="1.0" encoding="utf-8"?>
+<p:notes xmlns:a="http://schemas.openxmlformats.org/drawingml/2006/main" xmlns:r="http://schemas.openxmlformats.org/officeDocument/2006/relationships" xmlns:p="http://schemas.openxmlformats.org/presentationml/2006/main">
+  <p:cSld>
+    <p:spTree>
+      <p:nvGrpSpPr>
+        <p:cNvPr id="1" name=""/>
+        <p:cNvGrpSpPr/>
+        <p:nvPr/>
+      </p:nvGrpSpPr>
+      <p:grpSpPr>
+        <a:xfrm>
+          <a:off x="0" y="0"/>
+          <a:ext cx="0" cy="0"/>
+          <a:chOff x="0" y="0"/>
+          <a:chExt cx="0" cy="0"/>
+        </a:xfrm>
+      </p:grpSpPr>
+      <p:sp>
+        <p:nvSpPr>
+          <p:cNvPr id="2" name="Plassholder for lysbilde 1"/>
+          <p:cNvSpPr>
+            <a:spLocks noGrp="1" noRot="1" noChangeAspect="1"/>
+          </p:cNvSpPr>
+          <p:nvPr>
+            <p:ph type="sldImg"/>
+          </p:nvPr>
+        </p:nvSpPr>
+        <p:spPr/>
+      </p:sp>
+      <p:sp>
+        <p:nvSpPr>
+          <p:cNvPr id="3" name="Plassholder for notater 2"/>
+          <p:cNvSpPr>
+            <a:spLocks noGrp="1"/>
+          </p:cNvSpPr>
+          <p:nvPr>
+            <p:ph type="body" idx="1"/>
+          </p:nvPr>
+        </p:nvSpPr>
+        <p:spPr/>
+        <p:txBody>
+          <a:bodyPr/>
+          <a:lstStyle/>
+          <a:p>
+            <a:endParaRPr lang="nb-NO" dirty="0"/>
+          </a:p>
+        </p:txBody>
+      </p:sp>
+      <p:sp>
+        <p:nvSpPr>
+          <p:cNvPr id="4" name="Plassholder for lysbildenummer 3"/>
+          <p:cNvSpPr>
+            <a:spLocks noGrp="1"/>
+          </p:cNvSpPr>
+          <p:nvPr>
+            <p:ph type="sldNum" sz="quarter" idx="10"/>
+          </p:nvPr>
+        </p:nvSpPr>
+        <p:spPr/>
+        <p:txBody>
+          <a:bodyPr/>
+          <a:lstStyle/>
+          <a:p>
+            <a:fld id="{3CB6FB86-4866-4EC4-AEDD-6EE2270ABD1B}" type="slidenum">
+              <a:rPr lang="nb-NO" smtClean="0"/>
+              <a:t>5</a:t>
+            </a:fld>
+            <a:endParaRPr lang="nb-NO"/>
+          </a:p>
+        </p:txBody>
+      </p:sp>
+    </p:spTree>
+    <p:extLst>
+      <p:ext uri="{BB962C8B-B14F-4D97-AF65-F5344CB8AC3E}">
+        <p14:creationId xmlns:p14="http://schemas.microsoft.com/office/powerpoint/2010/main" val="588103954"/>
+      </p:ext>
+    </p:extLst>
+  </p:cSld>
+  <p:clrMapOvr>
+    <a:masterClrMapping/>
+  </p:clrMapOvr>
+</p:notes>
+</file>
+
 <file path=ppt/slideLayouts/slideLayout1.xml><?xml version="1.0" encoding="utf-8"?>
 <p:sldLayout xmlns:a="http://schemas.openxmlformats.org/drawingml/2006/main" xmlns:r="http://schemas.openxmlformats.org/officeDocument/2006/relationships" xmlns:p="http://schemas.openxmlformats.org/presentationml/2006/main" type="title" preserve="1">
   <p:cSld name="Tittellysbilde">
@@ -1143,7 +1228,7 @@
           <a:p>
             <a:fld id="{914F3582-1DE9-40E0-91CB-339B5AAB52EB}" type="datetimeFigureOut">
               <a:rPr lang="nb-NO" smtClean="0"/>
-              <a:t>02.04.2018</a:t>
+              <a:t>20.04.2018</a:t>
             </a:fld>
             <a:endParaRPr lang="nb-NO"/>
           </a:p>
@@ -1341,7 +1426,7 @@
           <a:p>
             <a:fld id="{914F3582-1DE9-40E0-91CB-339B5AAB52EB}" type="datetimeFigureOut">
               <a:rPr lang="nb-NO" smtClean="0"/>
-              <a:t>02.04.2018</a:t>
+              <a:t>20.04.2018</a:t>
             </a:fld>
             <a:endParaRPr lang="nb-NO"/>
           </a:p>
@@ -1549,7 +1634,7 @@
           <a:p>
             <a:fld id="{914F3582-1DE9-40E0-91CB-339B5AAB52EB}" type="datetimeFigureOut">
               <a:rPr lang="nb-NO" smtClean="0"/>
-              <a:t>02.04.2018</a:t>
+              <a:t>20.04.2018</a:t>
             </a:fld>
             <a:endParaRPr lang="nb-NO"/>
           </a:p>
@@ -1747,7 +1832,7 @@
           <a:p>
             <a:fld id="{914F3582-1DE9-40E0-91CB-339B5AAB52EB}" type="datetimeFigureOut">
               <a:rPr lang="nb-NO" smtClean="0"/>
-              <a:t>02.04.2018</a:t>
+              <a:t>20.04.2018</a:t>
             </a:fld>
             <a:endParaRPr lang="nb-NO"/>
           </a:p>
@@ -2022,7 +2107,7 @@
           <a:p>
             <a:fld id="{914F3582-1DE9-40E0-91CB-339B5AAB52EB}" type="datetimeFigureOut">
               <a:rPr lang="nb-NO" smtClean="0"/>
-              <a:t>02.04.2018</a:t>
+              <a:t>20.04.2018</a:t>
             </a:fld>
             <a:endParaRPr lang="nb-NO"/>
           </a:p>
@@ -2287,7 +2372,7 @@
           <a:p>
             <a:fld id="{914F3582-1DE9-40E0-91CB-339B5AAB52EB}" type="datetimeFigureOut">
               <a:rPr lang="nb-NO" smtClean="0"/>
-              <a:t>02.04.2018</a:t>
+              <a:t>20.04.2018</a:t>
             </a:fld>
             <a:endParaRPr lang="nb-NO"/>
           </a:p>
@@ -2699,7 +2784,7 @@
           <a:p>
             <a:fld id="{914F3582-1DE9-40E0-91CB-339B5AAB52EB}" type="datetimeFigureOut">
               <a:rPr lang="nb-NO" smtClean="0"/>
-              <a:t>02.04.2018</a:t>
+              <a:t>20.04.2018</a:t>
             </a:fld>
             <a:endParaRPr lang="nb-NO"/>
           </a:p>
@@ -2840,7 +2925,7 @@
           <a:p>
             <a:fld id="{914F3582-1DE9-40E0-91CB-339B5AAB52EB}" type="datetimeFigureOut">
               <a:rPr lang="nb-NO" smtClean="0"/>
-              <a:t>02.04.2018</a:t>
+              <a:t>20.04.2018</a:t>
             </a:fld>
             <a:endParaRPr lang="nb-NO"/>
           </a:p>
@@ -2953,7 +3038,7 @@
           <a:p>
             <a:fld id="{914F3582-1DE9-40E0-91CB-339B5AAB52EB}" type="datetimeFigureOut">
               <a:rPr lang="nb-NO" smtClean="0"/>
-              <a:t>02.04.2018</a:t>
+              <a:t>20.04.2018</a:t>
             </a:fld>
             <a:endParaRPr lang="nb-NO"/>
           </a:p>
@@ -3264,7 +3349,7 @@
           <a:p>
             <a:fld id="{914F3582-1DE9-40E0-91CB-339B5AAB52EB}" type="datetimeFigureOut">
               <a:rPr lang="nb-NO" smtClean="0"/>
-              <a:t>02.04.2018</a:t>
+              <a:t>20.04.2018</a:t>
             </a:fld>
             <a:endParaRPr lang="nb-NO"/>
           </a:p>
@@ -3552,7 +3637,7 @@
           <a:p>
             <a:fld id="{914F3582-1DE9-40E0-91CB-339B5AAB52EB}" type="datetimeFigureOut">
               <a:rPr lang="nb-NO" smtClean="0"/>
-              <a:t>02.04.2018</a:t>
+              <a:t>20.04.2018</a:t>
             </a:fld>
             <a:endParaRPr lang="nb-NO"/>
           </a:p>
@@ -3793,7 +3878,7 @@
           <a:p>
             <a:fld id="{914F3582-1DE9-40E0-91CB-339B5AAB52EB}" type="datetimeFigureOut">
               <a:rPr lang="nb-NO" smtClean="0"/>
-              <a:t>02.04.2018</a:t>
+              <a:t>20.04.2018</a:t>
             </a:fld>
             <a:endParaRPr lang="nb-NO"/>
           </a:p>
@@ -4227,7 +4312,7 @@
           <a:p>
             <a:r>
               <a:rPr lang="nb-NO" dirty="0"/>
-              <a:t>Image Pipeline </a:t>
+              <a:t>Image Processing Pipeline </a:t>
             </a:r>
             <a:r>
               <a:rPr lang="nb-NO" dirty="0" err="1"/>
@@ -4266,7 +4351,15 @@
             </a:r>
             <a:r>
               <a:rPr lang="nb-NO" dirty="0"/>
-              <a:t> an image </a:t>
+              <a:t> a </a:t>
+            </a:r>
+            <a:r>
+              <a:rPr lang="nb-NO" dirty="0" err="1"/>
+              <a:t>serverless</a:t>
+            </a:r>
+            <a:r>
+              <a:rPr lang="nb-NO" dirty="0"/>
+              <a:t> image </a:t>
             </a:r>
             <a:r>
               <a:rPr lang="nb-NO" dirty="0" err="1"/>
@@ -6531,6 +6624,2445 @@
     <p:extLst>
       <p:ext uri="{BB962C8B-B14F-4D97-AF65-F5344CB8AC3E}">
         <p14:creationId xmlns:p14="http://schemas.microsoft.com/office/powerpoint/2010/main" val="73648576"/>
+      </p:ext>
+    </p:extLst>
+  </p:cSld>
+  <p:clrMapOvr>
+    <a:masterClrMapping/>
+  </p:clrMapOvr>
+</p:sld>
+</file>
+
+<file path=ppt/slides/slide5.xml><?xml version="1.0" encoding="utf-8"?>
+<p:sld xmlns:a="http://schemas.openxmlformats.org/drawingml/2006/main" xmlns:r="http://schemas.openxmlformats.org/officeDocument/2006/relationships" xmlns:p="http://schemas.openxmlformats.org/presentationml/2006/main">
+  <p:cSld>
+    <p:spTree>
+      <p:nvGrpSpPr>
+        <p:cNvPr id="1" name=""/>
+        <p:cNvGrpSpPr/>
+        <p:nvPr/>
+      </p:nvGrpSpPr>
+      <p:grpSpPr>
+        <a:xfrm>
+          <a:off x="0" y="0"/>
+          <a:ext cx="0" cy="0"/>
+          <a:chOff x="0" y="0"/>
+          <a:chExt cx="0" cy="0"/>
+        </a:xfrm>
+      </p:grpSpPr>
+      <p:cxnSp>
+        <p:nvCxnSpPr>
+          <p:cNvPr id="102" name="Straight Arrow Connector 50">
+            <a:extLst>
+              <a:ext uri="{FF2B5EF4-FFF2-40B4-BE49-F238E27FC236}">
+                <a16:creationId xmlns:a16="http://schemas.microsoft.com/office/drawing/2014/main" id="{7B34437D-943A-498B-AFDF-1CC07718F410}"/>
+              </a:ext>
+            </a:extLst>
+          </p:cNvPr>
+          <p:cNvCxnSpPr>
+            <a:cxnSpLocks/>
+          </p:cNvCxnSpPr>
+          <p:nvPr/>
+        </p:nvCxnSpPr>
+        <p:spPr>
+          <a:xfrm>
+            <a:off x="5472861" y="3746034"/>
+            <a:ext cx="451311" cy="383722"/>
+          </a:xfrm>
+          <a:prstGeom prst="straightConnector1">
+            <a:avLst/>
+          </a:prstGeom>
+          <a:ln>
+            <a:tailEnd type="triangle"/>
+          </a:ln>
+          <a:effectLst>
+            <a:outerShdw blurRad="50800" dist="38100" dir="2700000" algn="tl" rotWithShape="0">
+              <a:prstClr val="black">
+                <a:alpha val="40000"/>
+              </a:prstClr>
+            </a:outerShdw>
+          </a:effectLst>
+        </p:spPr>
+        <p:style>
+          <a:lnRef idx="3">
+            <a:schemeClr val="accent2"/>
+          </a:lnRef>
+          <a:fillRef idx="0">
+            <a:schemeClr val="accent2"/>
+          </a:fillRef>
+          <a:effectRef idx="2">
+            <a:schemeClr val="accent2"/>
+          </a:effectRef>
+          <a:fontRef idx="minor">
+            <a:schemeClr val="tx1"/>
+          </a:fontRef>
+        </p:style>
+      </p:cxnSp>
+      <p:sp>
+        <p:nvSpPr>
+          <p:cNvPr id="64" name="TextBox 63"/>
+          <p:cNvSpPr txBox="1"/>
+          <p:nvPr/>
+        </p:nvSpPr>
+        <p:spPr>
+          <a:xfrm>
+            <a:off x="191416" y="355843"/>
+            <a:ext cx="11435725" cy="738664"/>
+          </a:xfrm>
+          <a:prstGeom prst="rect">
+            <a:avLst/>
+          </a:prstGeom>
+          <a:noFill/>
+        </p:spPr>
+        <p:txBody>
+          <a:bodyPr wrap="square" rtlCol="0">
+            <a:spAutoFit/>
+          </a:bodyPr>
+          <a:lstStyle/>
+          <a:p>
+            <a:r>
+              <a:rPr lang="nb-NO" sz="2400" dirty="0"/>
+              <a:t>Global </a:t>
+            </a:r>
+            <a:r>
+              <a:rPr lang="nb-NO" sz="2400" dirty="0" err="1"/>
+              <a:t>Azure</a:t>
+            </a:r>
+            <a:r>
+              <a:rPr lang="nb-NO" sz="2400" dirty="0"/>
+              <a:t> </a:t>
+            </a:r>
+            <a:r>
+              <a:rPr lang="nb-NO" sz="2400" dirty="0" err="1"/>
+              <a:t>Bootcamp</a:t>
+            </a:r>
+            <a:r>
+              <a:rPr lang="nb-NO" sz="2400" dirty="0"/>
+              <a:t> 2018 Image Pipeline </a:t>
+            </a:r>
+            <a:r>
+              <a:rPr lang="nb-NO" sz="2400" dirty="0" err="1"/>
+              <a:t>assignment</a:t>
+            </a:r>
+            <a:r>
+              <a:rPr lang="nb-NO" sz="2400" dirty="0"/>
+              <a:t>  - final </a:t>
+            </a:r>
+            <a:r>
+              <a:rPr lang="nb-NO" sz="2400" dirty="0" err="1"/>
+              <a:t>solution</a:t>
+            </a:r>
+            <a:r>
+              <a:rPr lang="nb-NO" sz="2400" dirty="0"/>
+              <a:t> </a:t>
+            </a:r>
+            <a:r>
+              <a:rPr lang="nb-NO" sz="2400" dirty="0" err="1"/>
+              <a:t>example</a:t>
+            </a:r>
+            <a:endParaRPr lang="nb-NO" sz="2400" dirty="0"/>
+          </a:p>
+          <a:p>
+            <a:r>
+              <a:rPr lang="nb-NO" dirty="0"/>
+              <a:t>Components and data </a:t>
+            </a:r>
+            <a:r>
+              <a:rPr lang="nb-NO" dirty="0" err="1"/>
+              <a:t>flow</a:t>
+            </a:r>
+            <a:endParaRPr lang="en-US" dirty="0"/>
+          </a:p>
+        </p:txBody>
+      </p:sp>
+      <p:cxnSp>
+        <p:nvCxnSpPr>
+          <p:cNvPr id="90" name="Straight Arrow Connector 50"/>
+          <p:cNvCxnSpPr>
+            <a:cxnSpLocks/>
+          </p:cNvCxnSpPr>
+          <p:nvPr/>
+        </p:nvCxnSpPr>
+        <p:spPr>
+          <a:xfrm>
+            <a:off x="1571411" y="3215902"/>
+            <a:ext cx="1564815" cy="0"/>
+          </a:xfrm>
+          <a:prstGeom prst="straightConnector1">
+            <a:avLst/>
+          </a:prstGeom>
+          <a:ln>
+            <a:tailEnd type="triangle"/>
+          </a:ln>
+          <a:effectLst>
+            <a:outerShdw blurRad="50800" dist="38100" dir="2700000" algn="tl" rotWithShape="0">
+              <a:prstClr val="black">
+                <a:alpha val="40000"/>
+              </a:prstClr>
+            </a:outerShdw>
+          </a:effectLst>
+        </p:spPr>
+        <p:style>
+          <a:lnRef idx="3">
+            <a:schemeClr val="accent2"/>
+          </a:lnRef>
+          <a:fillRef idx="0">
+            <a:schemeClr val="accent2"/>
+          </a:fillRef>
+          <a:effectRef idx="2">
+            <a:schemeClr val="accent2"/>
+          </a:effectRef>
+          <a:fontRef idx="minor">
+            <a:schemeClr val="tx1"/>
+          </a:fontRef>
+        </p:style>
+      </p:cxnSp>
+      <p:pic>
+        <p:nvPicPr>
+          <p:cNvPr id="6" name="Bilde 5">
+            <a:extLst>
+              <a:ext uri="{FF2B5EF4-FFF2-40B4-BE49-F238E27FC236}">
+                <a16:creationId xmlns:a16="http://schemas.microsoft.com/office/drawing/2014/main" id="{0BBFE5E9-426C-4FD2-8C6B-247C802FDE85}"/>
+              </a:ext>
+            </a:extLst>
+          </p:cNvPr>
+          <p:cNvPicPr>
+            <a:picLocks noChangeAspect="1"/>
+          </p:cNvPicPr>
+          <p:nvPr/>
+        </p:nvPicPr>
+        <p:blipFill>
+          <a:blip r:embed="rId3">
+            <a:extLst>
+              <a:ext uri="{28A0092B-C50C-407E-A947-70E740481C1C}">
+                <a14:useLocalDpi xmlns:a14="http://schemas.microsoft.com/office/drawing/2010/main" val="0"/>
+              </a:ext>
+            </a:extLst>
+          </a:blip>
+          <a:stretch>
+            <a:fillRect/>
+          </a:stretch>
+        </p:blipFill>
+        <p:spPr>
+          <a:xfrm>
+            <a:off x="3368234" y="2964606"/>
+            <a:ext cx="502591" cy="502591"/>
+          </a:xfrm>
+          <a:prstGeom prst="rect">
+            <a:avLst/>
+          </a:prstGeom>
+        </p:spPr>
+      </p:pic>
+      <p:pic>
+        <p:nvPicPr>
+          <p:cNvPr id="8" name="Bilde 7">
+            <a:extLst>
+              <a:ext uri="{FF2B5EF4-FFF2-40B4-BE49-F238E27FC236}">
+                <a16:creationId xmlns:a16="http://schemas.microsoft.com/office/drawing/2014/main" id="{48757FCF-F2E4-41DC-B2ED-9B6DC9425021}"/>
+              </a:ext>
+            </a:extLst>
+          </p:cNvPr>
+          <p:cNvPicPr>
+            <a:picLocks noChangeAspect="1"/>
+          </p:cNvPicPr>
+          <p:nvPr/>
+        </p:nvPicPr>
+        <p:blipFill>
+          <a:blip r:embed="rId4">
+            <a:extLst>
+              <a:ext uri="{28A0092B-C50C-407E-A947-70E740481C1C}">
+                <a14:useLocalDpi xmlns:a14="http://schemas.microsoft.com/office/drawing/2010/main" val="0"/>
+              </a:ext>
+            </a:extLst>
+          </a:blip>
+          <a:stretch>
+            <a:fillRect/>
+          </a:stretch>
+        </p:blipFill>
+        <p:spPr>
+          <a:xfrm>
+            <a:off x="890906" y="2938377"/>
+            <a:ext cx="502591" cy="502591"/>
+          </a:xfrm>
+          <a:prstGeom prst="rect">
+            <a:avLst/>
+          </a:prstGeom>
+        </p:spPr>
+      </p:pic>
+      <p:pic>
+        <p:nvPicPr>
+          <p:cNvPr id="11" name="Bilde 10">
+            <a:extLst>
+              <a:ext uri="{FF2B5EF4-FFF2-40B4-BE49-F238E27FC236}">
+                <a16:creationId xmlns:a16="http://schemas.microsoft.com/office/drawing/2014/main" id="{21A53200-E8C9-4207-AF1B-E3F77643D164}"/>
+              </a:ext>
+            </a:extLst>
+          </p:cNvPr>
+          <p:cNvPicPr>
+            <a:picLocks noChangeAspect="1"/>
+          </p:cNvPicPr>
+          <p:nvPr/>
+        </p:nvPicPr>
+        <p:blipFill>
+          <a:blip r:embed="rId5">
+            <a:extLst>
+              <a:ext uri="{28A0092B-C50C-407E-A947-70E740481C1C}">
+                <a14:useLocalDpi xmlns:a14="http://schemas.microsoft.com/office/drawing/2010/main" val="0"/>
+              </a:ext>
+            </a:extLst>
+          </a:blip>
+          <a:stretch>
+            <a:fillRect/>
+          </a:stretch>
+        </p:blipFill>
+        <p:spPr>
+          <a:xfrm>
+            <a:off x="4832821" y="2942399"/>
+            <a:ext cx="502591" cy="502591"/>
+          </a:xfrm>
+          <a:prstGeom prst="rect">
+            <a:avLst/>
+          </a:prstGeom>
+        </p:spPr>
+      </p:pic>
+      <p:cxnSp>
+        <p:nvCxnSpPr>
+          <p:cNvPr id="40" name="Straight Arrow Connector 50">
+            <a:extLst>
+              <a:ext uri="{FF2B5EF4-FFF2-40B4-BE49-F238E27FC236}">
+                <a16:creationId xmlns:a16="http://schemas.microsoft.com/office/drawing/2014/main" id="{F0F711CF-27D7-4E45-A20D-8A35ABDAA3CD}"/>
+              </a:ext>
+            </a:extLst>
+          </p:cNvPr>
+          <p:cNvCxnSpPr>
+            <a:cxnSpLocks/>
+          </p:cNvCxnSpPr>
+          <p:nvPr/>
+        </p:nvCxnSpPr>
+        <p:spPr>
+          <a:xfrm flipV="1">
+            <a:off x="5458585" y="3188125"/>
+            <a:ext cx="628791" cy="10147"/>
+          </a:xfrm>
+          <a:prstGeom prst="straightConnector1">
+            <a:avLst/>
+          </a:prstGeom>
+          <a:ln>
+            <a:tailEnd type="triangle"/>
+          </a:ln>
+          <a:effectLst>
+            <a:outerShdw blurRad="50800" dist="38100" dir="2700000" algn="tl" rotWithShape="0">
+              <a:prstClr val="black">
+                <a:alpha val="40000"/>
+              </a:prstClr>
+            </a:outerShdw>
+          </a:effectLst>
+        </p:spPr>
+        <p:style>
+          <a:lnRef idx="3">
+            <a:schemeClr val="accent2"/>
+          </a:lnRef>
+          <a:fillRef idx="0">
+            <a:schemeClr val="accent2"/>
+          </a:fillRef>
+          <a:effectRef idx="2">
+            <a:schemeClr val="accent2"/>
+          </a:effectRef>
+          <a:fontRef idx="minor">
+            <a:schemeClr val="tx1"/>
+          </a:fontRef>
+        </p:style>
+      </p:cxnSp>
+      <p:pic>
+        <p:nvPicPr>
+          <p:cNvPr id="43" name="Bilde 42">
+            <a:extLst>
+              <a:ext uri="{FF2B5EF4-FFF2-40B4-BE49-F238E27FC236}">
+                <a16:creationId xmlns:a16="http://schemas.microsoft.com/office/drawing/2014/main" id="{3DE1A74F-0CFF-46EF-8F1F-E52A7F49274E}"/>
+              </a:ext>
+            </a:extLst>
+          </p:cNvPr>
+          <p:cNvPicPr>
+            <a:picLocks noChangeAspect="1"/>
+          </p:cNvPicPr>
+          <p:nvPr/>
+        </p:nvPicPr>
+        <p:blipFill>
+          <a:blip r:embed="rId3">
+            <a:extLst>
+              <a:ext uri="{28A0092B-C50C-407E-A947-70E740481C1C}">
+                <a14:useLocalDpi xmlns:a14="http://schemas.microsoft.com/office/drawing/2010/main" val="0"/>
+              </a:ext>
+            </a:extLst>
+          </a:blip>
+          <a:stretch>
+            <a:fillRect/>
+          </a:stretch>
+        </p:blipFill>
+        <p:spPr>
+          <a:xfrm>
+            <a:off x="6200093" y="2964956"/>
+            <a:ext cx="502591" cy="502591"/>
+          </a:xfrm>
+          <a:prstGeom prst="rect">
+            <a:avLst/>
+          </a:prstGeom>
+        </p:spPr>
+      </p:pic>
+      <p:cxnSp>
+        <p:nvCxnSpPr>
+          <p:cNvPr id="49" name="Straight Arrow Connector 50">
+            <a:extLst>
+              <a:ext uri="{FF2B5EF4-FFF2-40B4-BE49-F238E27FC236}">
+                <a16:creationId xmlns:a16="http://schemas.microsoft.com/office/drawing/2014/main" id="{0B60FFF8-92AB-44B2-A372-6128302985A4}"/>
+              </a:ext>
+            </a:extLst>
+          </p:cNvPr>
+          <p:cNvCxnSpPr>
+            <a:cxnSpLocks/>
+          </p:cNvCxnSpPr>
+          <p:nvPr/>
+        </p:nvCxnSpPr>
+        <p:spPr>
+          <a:xfrm>
+            <a:off x="3946599" y="3192869"/>
+            <a:ext cx="788907" cy="5403"/>
+          </a:xfrm>
+          <a:prstGeom prst="straightConnector1">
+            <a:avLst/>
+          </a:prstGeom>
+          <a:ln>
+            <a:tailEnd type="triangle"/>
+          </a:ln>
+          <a:effectLst>
+            <a:outerShdw blurRad="50800" dist="38100" dir="2700000" algn="tl" rotWithShape="0">
+              <a:prstClr val="black">
+                <a:alpha val="40000"/>
+              </a:prstClr>
+            </a:outerShdw>
+          </a:effectLst>
+        </p:spPr>
+        <p:style>
+          <a:lnRef idx="3">
+            <a:schemeClr val="accent2"/>
+          </a:lnRef>
+          <a:fillRef idx="0">
+            <a:schemeClr val="accent2"/>
+          </a:fillRef>
+          <a:effectRef idx="2">
+            <a:schemeClr val="accent2"/>
+          </a:effectRef>
+          <a:fontRef idx="minor">
+            <a:schemeClr val="tx1"/>
+          </a:fontRef>
+        </p:style>
+      </p:cxnSp>
+      <p:sp>
+        <p:nvSpPr>
+          <p:cNvPr id="186" name="Rectangle 34">
+            <a:extLst>
+              <a:ext uri="{FF2B5EF4-FFF2-40B4-BE49-F238E27FC236}">
+                <a16:creationId xmlns:a16="http://schemas.microsoft.com/office/drawing/2014/main" id="{FEBF3080-D270-45BF-BBE2-7D3134903405}"/>
+              </a:ext>
+            </a:extLst>
+          </p:cNvPr>
+          <p:cNvSpPr/>
+          <p:nvPr/>
+        </p:nvSpPr>
+        <p:spPr>
+          <a:xfrm>
+            <a:off x="191416" y="4340849"/>
+            <a:ext cx="3031663" cy="2295221"/>
+          </a:xfrm>
+          <a:prstGeom prst="rect">
+            <a:avLst/>
+          </a:prstGeom>
+        </p:spPr>
+        <p:style>
+          <a:lnRef idx="2">
+            <a:schemeClr val="dk1"/>
+          </a:lnRef>
+          <a:fillRef idx="1">
+            <a:schemeClr val="lt1"/>
+          </a:fillRef>
+          <a:effectRef idx="0">
+            <a:schemeClr val="dk1"/>
+          </a:effectRef>
+          <a:fontRef idx="minor">
+            <a:schemeClr val="dk1"/>
+          </a:fontRef>
+        </p:style>
+        <p:txBody>
+          <a:bodyPr rtlCol="0" anchor="ctr"/>
+          <a:lstStyle/>
+          <a:p>
+            <a:pPr algn="ctr"/>
+            <a:endParaRPr lang="en-US" dirty="0"/>
+          </a:p>
+        </p:txBody>
+      </p:sp>
+      <p:sp>
+        <p:nvSpPr>
+          <p:cNvPr id="187" name="TekstSylinder 186">
+            <a:extLst>
+              <a:ext uri="{FF2B5EF4-FFF2-40B4-BE49-F238E27FC236}">
+                <a16:creationId xmlns:a16="http://schemas.microsoft.com/office/drawing/2014/main" id="{E9A3B864-2D76-4279-ACD8-7E4EBDC44758}"/>
+              </a:ext>
+            </a:extLst>
+          </p:cNvPr>
+          <p:cNvSpPr txBox="1"/>
+          <p:nvPr/>
+        </p:nvSpPr>
+        <p:spPr>
+          <a:xfrm>
+            <a:off x="349451" y="5929564"/>
+            <a:ext cx="1589268" cy="400110"/>
+          </a:xfrm>
+          <a:prstGeom prst="rect">
+            <a:avLst/>
+          </a:prstGeom>
+          <a:noFill/>
+        </p:spPr>
+        <p:txBody>
+          <a:bodyPr wrap="square" rtlCol="0">
+            <a:spAutoFit/>
+          </a:bodyPr>
+          <a:lstStyle/>
+          <a:p>
+            <a:r>
+              <a:rPr lang="nb-NO" sz="2000" dirty="0" err="1"/>
+              <a:t>Blob</a:t>
+            </a:r>
+            <a:r>
+              <a:rPr lang="nb-NO" sz="2000" dirty="0"/>
+              <a:t> Storage</a:t>
+            </a:r>
+          </a:p>
+        </p:txBody>
+      </p:sp>
+      <p:pic>
+        <p:nvPicPr>
+          <p:cNvPr id="188" name="Bilde 187">
+            <a:extLst>
+              <a:ext uri="{FF2B5EF4-FFF2-40B4-BE49-F238E27FC236}">
+                <a16:creationId xmlns:a16="http://schemas.microsoft.com/office/drawing/2014/main" id="{06ADA121-F660-495F-92A0-F3DFE0851441}"/>
+              </a:ext>
+            </a:extLst>
+          </p:cNvPr>
+          <p:cNvPicPr>
+            <a:picLocks noChangeAspect="1"/>
+          </p:cNvPicPr>
+          <p:nvPr/>
+        </p:nvPicPr>
+        <p:blipFill>
+          <a:blip r:embed="rId5">
+            <a:extLst>
+              <a:ext uri="{28A0092B-C50C-407E-A947-70E740481C1C}">
+                <a14:useLocalDpi xmlns:a14="http://schemas.microsoft.com/office/drawing/2010/main" val="0"/>
+              </a:ext>
+            </a:extLst>
+          </a:blip>
+          <a:stretch>
+            <a:fillRect/>
+          </a:stretch>
+        </p:blipFill>
+        <p:spPr>
+          <a:xfrm>
+            <a:off x="2446006" y="5866722"/>
+            <a:ext cx="525794" cy="525794"/>
+          </a:xfrm>
+          <a:prstGeom prst="rect">
+            <a:avLst/>
+          </a:prstGeom>
+        </p:spPr>
+      </p:pic>
+      <p:sp>
+        <p:nvSpPr>
+          <p:cNvPr id="189" name="TekstSylinder 188">
+            <a:extLst>
+              <a:ext uri="{FF2B5EF4-FFF2-40B4-BE49-F238E27FC236}">
+                <a16:creationId xmlns:a16="http://schemas.microsoft.com/office/drawing/2014/main" id="{4CA0D0F3-A3C2-4E4F-B6D5-AF27EC5A7A9F}"/>
+              </a:ext>
+            </a:extLst>
+          </p:cNvPr>
+          <p:cNvSpPr txBox="1"/>
+          <p:nvPr/>
+        </p:nvSpPr>
+        <p:spPr>
+          <a:xfrm>
+            <a:off x="349451" y="5288956"/>
+            <a:ext cx="1415849" cy="400110"/>
+          </a:xfrm>
+          <a:prstGeom prst="rect">
+            <a:avLst/>
+          </a:prstGeom>
+          <a:noFill/>
+        </p:spPr>
+        <p:txBody>
+          <a:bodyPr wrap="square" rtlCol="0">
+            <a:spAutoFit/>
+          </a:bodyPr>
+          <a:lstStyle/>
+          <a:p>
+            <a:r>
+              <a:rPr lang="nb-NO" sz="2000" dirty="0" err="1"/>
+              <a:t>App</a:t>
+            </a:r>
+            <a:r>
+              <a:rPr lang="nb-NO" sz="2000" dirty="0"/>
+              <a:t> Service</a:t>
+            </a:r>
+          </a:p>
+        </p:txBody>
+      </p:sp>
+      <p:pic>
+        <p:nvPicPr>
+          <p:cNvPr id="190" name="Bilde 189">
+            <a:extLst>
+              <a:ext uri="{FF2B5EF4-FFF2-40B4-BE49-F238E27FC236}">
+                <a16:creationId xmlns:a16="http://schemas.microsoft.com/office/drawing/2014/main" id="{59BAFC09-F5F4-4253-8CE7-90DB194C8D98}"/>
+              </a:ext>
+            </a:extLst>
+          </p:cNvPr>
+          <p:cNvPicPr>
+            <a:picLocks noChangeAspect="1"/>
+          </p:cNvPicPr>
+          <p:nvPr/>
+        </p:nvPicPr>
+        <p:blipFill>
+          <a:blip r:embed="rId4">
+            <a:extLst>
+              <a:ext uri="{28A0092B-C50C-407E-A947-70E740481C1C}">
+                <a14:useLocalDpi xmlns:a14="http://schemas.microsoft.com/office/drawing/2010/main" val="0"/>
+              </a:ext>
+            </a:extLst>
+          </a:blip>
+          <a:stretch>
+            <a:fillRect/>
+          </a:stretch>
+        </p:blipFill>
+        <p:spPr>
+          <a:xfrm>
+            <a:off x="2446006" y="5223253"/>
+            <a:ext cx="525794" cy="525794"/>
+          </a:xfrm>
+          <a:prstGeom prst="rect">
+            <a:avLst/>
+          </a:prstGeom>
+        </p:spPr>
+      </p:pic>
+      <p:pic>
+        <p:nvPicPr>
+          <p:cNvPr id="191" name="Bilde 190">
+            <a:extLst>
+              <a:ext uri="{FF2B5EF4-FFF2-40B4-BE49-F238E27FC236}">
+                <a16:creationId xmlns:a16="http://schemas.microsoft.com/office/drawing/2014/main" id="{9D88AF8F-38DB-463B-9F43-6F395B2A1813}"/>
+              </a:ext>
+            </a:extLst>
+          </p:cNvPr>
+          <p:cNvPicPr>
+            <a:picLocks noChangeAspect="1"/>
+          </p:cNvPicPr>
+          <p:nvPr/>
+        </p:nvPicPr>
+        <p:blipFill>
+          <a:blip r:embed="rId3">
+            <a:extLst>
+              <a:ext uri="{28A0092B-C50C-407E-A947-70E740481C1C}">
+                <a14:useLocalDpi xmlns:a14="http://schemas.microsoft.com/office/drawing/2010/main" val="0"/>
+              </a:ext>
+            </a:extLst>
+          </a:blip>
+          <a:stretch>
+            <a:fillRect/>
+          </a:stretch>
+        </p:blipFill>
+        <p:spPr>
+          <a:xfrm>
+            <a:off x="2446006" y="4562923"/>
+            <a:ext cx="525794" cy="525794"/>
+          </a:xfrm>
+          <a:prstGeom prst="rect">
+            <a:avLst/>
+          </a:prstGeom>
+        </p:spPr>
+      </p:pic>
+      <p:sp>
+        <p:nvSpPr>
+          <p:cNvPr id="192" name="TekstSylinder 191">
+            <a:extLst>
+              <a:ext uri="{FF2B5EF4-FFF2-40B4-BE49-F238E27FC236}">
+                <a16:creationId xmlns:a16="http://schemas.microsoft.com/office/drawing/2014/main" id="{59135D70-4A14-43FC-949F-62EE24D34FA7}"/>
+              </a:ext>
+            </a:extLst>
+          </p:cNvPr>
+          <p:cNvSpPr txBox="1"/>
+          <p:nvPr/>
+        </p:nvSpPr>
+        <p:spPr>
+          <a:xfrm>
+            <a:off x="349451" y="4581003"/>
+            <a:ext cx="1815552" cy="400110"/>
+          </a:xfrm>
+          <a:prstGeom prst="rect">
+            <a:avLst/>
+          </a:prstGeom>
+          <a:noFill/>
+        </p:spPr>
+        <p:txBody>
+          <a:bodyPr wrap="square" rtlCol="0">
+            <a:spAutoFit/>
+          </a:bodyPr>
+          <a:lstStyle/>
+          <a:p>
+            <a:r>
+              <a:rPr lang="nb-NO" sz="2000" dirty="0" err="1"/>
+              <a:t>Azure</a:t>
+            </a:r>
+            <a:r>
+              <a:rPr lang="nb-NO" sz="2000" dirty="0"/>
+              <a:t> </a:t>
+            </a:r>
+            <a:r>
+              <a:rPr lang="nb-NO" sz="2000" dirty="0" err="1"/>
+              <a:t>Function</a:t>
+            </a:r>
+            <a:endParaRPr lang="nb-NO" sz="2000" dirty="0"/>
+          </a:p>
+        </p:txBody>
+      </p:sp>
+      <p:pic>
+        <p:nvPicPr>
+          <p:cNvPr id="36" name="Bilde 35">
+            <a:extLst>
+              <a:ext uri="{FF2B5EF4-FFF2-40B4-BE49-F238E27FC236}">
+                <a16:creationId xmlns:a16="http://schemas.microsoft.com/office/drawing/2014/main" id="{307C58A7-4D89-4758-8858-28AF46DB4996}"/>
+              </a:ext>
+            </a:extLst>
+          </p:cNvPr>
+          <p:cNvPicPr>
+            <a:picLocks noChangeAspect="1"/>
+          </p:cNvPicPr>
+          <p:nvPr/>
+        </p:nvPicPr>
+        <p:blipFill>
+          <a:blip r:embed="rId5">
+            <a:extLst>
+              <a:ext uri="{28A0092B-C50C-407E-A947-70E740481C1C}">
+                <a14:useLocalDpi xmlns:a14="http://schemas.microsoft.com/office/drawing/2010/main" val="0"/>
+              </a:ext>
+            </a:extLst>
+          </a:blip>
+          <a:stretch>
+            <a:fillRect/>
+          </a:stretch>
+        </p:blipFill>
+        <p:spPr>
+          <a:xfrm>
+            <a:off x="7650832" y="2931146"/>
+            <a:ext cx="502591" cy="502591"/>
+          </a:xfrm>
+          <a:prstGeom prst="rect">
+            <a:avLst/>
+          </a:prstGeom>
+        </p:spPr>
+      </p:pic>
+      <p:pic>
+        <p:nvPicPr>
+          <p:cNvPr id="42" name="Bilde 41">
+            <a:extLst>
+              <a:ext uri="{FF2B5EF4-FFF2-40B4-BE49-F238E27FC236}">
+                <a16:creationId xmlns:a16="http://schemas.microsoft.com/office/drawing/2014/main" id="{A0FF1FDE-9132-43CF-9ADB-DD11B32D3563}"/>
+              </a:ext>
+            </a:extLst>
+          </p:cNvPr>
+          <p:cNvPicPr>
+            <a:picLocks noChangeAspect="1"/>
+          </p:cNvPicPr>
+          <p:nvPr/>
+        </p:nvPicPr>
+        <p:blipFill>
+          <a:blip r:embed="rId5">
+            <a:extLst>
+              <a:ext uri="{28A0092B-C50C-407E-A947-70E740481C1C}">
+                <a14:useLocalDpi xmlns:a14="http://schemas.microsoft.com/office/drawing/2010/main" val="0"/>
+              </a:ext>
+            </a:extLst>
+          </a:blip>
+          <a:stretch>
+            <a:fillRect/>
+          </a:stretch>
+        </p:blipFill>
+        <p:spPr>
+          <a:xfrm>
+            <a:off x="7650832" y="2054241"/>
+            <a:ext cx="502591" cy="502591"/>
+          </a:xfrm>
+          <a:prstGeom prst="rect">
+            <a:avLst/>
+          </a:prstGeom>
+        </p:spPr>
+      </p:pic>
+      <p:pic>
+        <p:nvPicPr>
+          <p:cNvPr id="45" name="Bilde 44">
+            <a:extLst>
+              <a:ext uri="{FF2B5EF4-FFF2-40B4-BE49-F238E27FC236}">
+                <a16:creationId xmlns:a16="http://schemas.microsoft.com/office/drawing/2014/main" id="{FB509313-AA34-49F7-BCED-8D5C9A967325}"/>
+              </a:ext>
+            </a:extLst>
+          </p:cNvPr>
+          <p:cNvPicPr>
+            <a:picLocks noChangeAspect="1"/>
+          </p:cNvPicPr>
+          <p:nvPr/>
+        </p:nvPicPr>
+        <p:blipFill>
+          <a:blip r:embed="rId5">
+            <a:extLst>
+              <a:ext uri="{28A0092B-C50C-407E-A947-70E740481C1C}">
+                <a14:useLocalDpi xmlns:a14="http://schemas.microsoft.com/office/drawing/2010/main" val="0"/>
+              </a:ext>
+            </a:extLst>
+          </a:blip>
+          <a:stretch>
+            <a:fillRect/>
+          </a:stretch>
+        </p:blipFill>
+        <p:spPr>
+          <a:xfrm>
+            <a:off x="7662409" y="3890821"/>
+            <a:ext cx="502591" cy="502591"/>
+          </a:xfrm>
+          <a:prstGeom prst="rect">
+            <a:avLst/>
+          </a:prstGeom>
+        </p:spPr>
+      </p:pic>
+      <p:pic>
+        <p:nvPicPr>
+          <p:cNvPr id="48" name="Bilde 47">
+            <a:extLst>
+              <a:ext uri="{FF2B5EF4-FFF2-40B4-BE49-F238E27FC236}">
+                <a16:creationId xmlns:a16="http://schemas.microsoft.com/office/drawing/2014/main" id="{C651FC47-1DF9-4B96-97A7-675A070DCAE4}"/>
+              </a:ext>
+            </a:extLst>
+          </p:cNvPr>
+          <p:cNvPicPr>
+            <a:picLocks noChangeAspect="1"/>
+          </p:cNvPicPr>
+          <p:nvPr/>
+        </p:nvPicPr>
+        <p:blipFill>
+          <a:blip r:embed="rId5">
+            <a:extLst>
+              <a:ext uri="{28A0092B-C50C-407E-A947-70E740481C1C}">
+                <a14:useLocalDpi xmlns:a14="http://schemas.microsoft.com/office/drawing/2010/main" val="0"/>
+              </a:ext>
+            </a:extLst>
+          </a:blip>
+          <a:stretch>
+            <a:fillRect/>
+          </a:stretch>
+        </p:blipFill>
+        <p:spPr>
+          <a:xfrm>
+            <a:off x="10492944" y="2943022"/>
+            <a:ext cx="502591" cy="502591"/>
+          </a:xfrm>
+          <a:prstGeom prst="rect">
+            <a:avLst/>
+          </a:prstGeom>
+        </p:spPr>
+      </p:pic>
+      <p:pic>
+        <p:nvPicPr>
+          <p:cNvPr id="50" name="Bilde 49">
+            <a:extLst>
+              <a:ext uri="{FF2B5EF4-FFF2-40B4-BE49-F238E27FC236}">
+                <a16:creationId xmlns:a16="http://schemas.microsoft.com/office/drawing/2014/main" id="{CB793362-CA43-481E-8D7D-A656FAA21BFD}"/>
+              </a:ext>
+            </a:extLst>
+          </p:cNvPr>
+          <p:cNvPicPr>
+            <a:picLocks noChangeAspect="1"/>
+          </p:cNvPicPr>
+          <p:nvPr/>
+        </p:nvPicPr>
+        <p:blipFill>
+          <a:blip r:embed="rId5">
+            <a:extLst>
+              <a:ext uri="{28A0092B-C50C-407E-A947-70E740481C1C}">
+                <a14:useLocalDpi xmlns:a14="http://schemas.microsoft.com/office/drawing/2010/main" val="0"/>
+              </a:ext>
+            </a:extLst>
+          </a:blip>
+          <a:stretch>
+            <a:fillRect/>
+          </a:stretch>
+        </p:blipFill>
+        <p:spPr>
+          <a:xfrm>
+            <a:off x="10477687" y="2024948"/>
+            <a:ext cx="502591" cy="502591"/>
+          </a:xfrm>
+          <a:prstGeom prst="rect">
+            <a:avLst/>
+          </a:prstGeom>
+        </p:spPr>
+      </p:pic>
+      <p:sp>
+        <p:nvSpPr>
+          <p:cNvPr id="51" name="TekstSylinder 50">
+            <a:extLst>
+              <a:ext uri="{FF2B5EF4-FFF2-40B4-BE49-F238E27FC236}">
+                <a16:creationId xmlns:a16="http://schemas.microsoft.com/office/drawing/2014/main" id="{CC3B0DD8-307B-4C40-A1CB-C7F606E63545}"/>
+              </a:ext>
+            </a:extLst>
+          </p:cNvPr>
+          <p:cNvSpPr txBox="1"/>
+          <p:nvPr/>
+        </p:nvSpPr>
+        <p:spPr>
+          <a:xfrm>
+            <a:off x="9815997" y="3415040"/>
+            <a:ext cx="1920719" cy="261610"/>
+          </a:xfrm>
+          <a:prstGeom prst="rect">
+            <a:avLst/>
+          </a:prstGeom>
+          <a:noFill/>
+        </p:spPr>
+        <p:txBody>
+          <a:bodyPr wrap="none" rtlCol="0">
+            <a:spAutoFit/>
+          </a:bodyPr>
+          <a:lstStyle/>
+          <a:p>
+            <a:pPr algn="ctr"/>
+            <a:r>
+              <a:rPr lang="nb-NO" sz="1100" dirty="0"/>
+              <a:t>imagepipeline-</a:t>
+            </a:r>
+            <a:r>
+              <a:rPr lang="nb-NO" sz="1100" dirty="0" err="1"/>
+              <a:t>colormatrix</a:t>
+            </a:r>
+            <a:r>
+              <a:rPr lang="nb-NO" sz="1100" dirty="0"/>
+              <a:t>-md</a:t>
+            </a:r>
+          </a:p>
+        </p:txBody>
+      </p:sp>
+      <p:pic>
+        <p:nvPicPr>
+          <p:cNvPr id="52" name="Bilde 51">
+            <a:extLst>
+              <a:ext uri="{FF2B5EF4-FFF2-40B4-BE49-F238E27FC236}">
+                <a16:creationId xmlns:a16="http://schemas.microsoft.com/office/drawing/2014/main" id="{C18186A7-F1D3-48B7-A2BF-EDABB90E2570}"/>
+              </a:ext>
+            </a:extLst>
+          </p:cNvPr>
+          <p:cNvPicPr>
+            <a:picLocks noChangeAspect="1"/>
+          </p:cNvPicPr>
+          <p:nvPr/>
+        </p:nvPicPr>
+        <p:blipFill>
+          <a:blip r:embed="rId5">
+            <a:extLst>
+              <a:ext uri="{28A0092B-C50C-407E-A947-70E740481C1C}">
+                <a14:useLocalDpi xmlns:a14="http://schemas.microsoft.com/office/drawing/2010/main" val="0"/>
+              </a:ext>
+            </a:extLst>
+          </a:blip>
+          <a:stretch>
+            <a:fillRect/>
+          </a:stretch>
+        </p:blipFill>
+        <p:spPr>
+          <a:xfrm>
+            <a:off x="10492944" y="3892407"/>
+            <a:ext cx="502591" cy="502591"/>
+          </a:xfrm>
+          <a:prstGeom prst="rect">
+            <a:avLst/>
+          </a:prstGeom>
+        </p:spPr>
+      </p:pic>
+      <p:sp>
+        <p:nvSpPr>
+          <p:cNvPr id="53" name="TekstSylinder 52">
+            <a:extLst>
+              <a:ext uri="{FF2B5EF4-FFF2-40B4-BE49-F238E27FC236}">
+                <a16:creationId xmlns:a16="http://schemas.microsoft.com/office/drawing/2014/main" id="{49D3916E-3AC7-45FE-B8F9-358931B0E99A}"/>
+              </a:ext>
+            </a:extLst>
+          </p:cNvPr>
+          <p:cNvSpPr txBox="1"/>
+          <p:nvPr/>
+        </p:nvSpPr>
+        <p:spPr>
+          <a:xfrm>
+            <a:off x="9825615" y="4366974"/>
+            <a:ext cx="1901483" cy="261610"/>
+          </a:xfrm>
+          <a:prstGeom prst="rect">
+            <a:avLst/>
+          </a:prstGeom>
+          <a:noFill/>
+        </p:spPr>
+        <p:txBody>
+          <a:bodyPr wrap="none" rtlCol="0">
+            <a:spAutoFit/>
+          </a:bodyPr>
+          <a:lstStyle/>
+          <a:p>
+            <a:pPr algn="ctr"/>
+            <a:r>
+              <a:rPr lang="nb-NO" sz="1100" dirty="0"/>
+              <a:t>imagepipeline-</a:t>
+            </a:r>
+            <a:r>
+              <a:rPr lang="nb-NO" sz="1100" dirty="0" err="1"/>
+              <a:t>colormatrix</a:t>
+            </a:r>
+            <a:r>
+              <a:rPr lang="nb-NO" sz="1100" dirty="0"/>
+              <a:t>-</a:t>
+            </a:r>
+            <a:r>
+              <a:rPr lang="nb-NO" sz="1100" dirty="0" err="1"/>
+              <a:t>sm</a:t>
+            </a:r>
+            <a:endParaRPr lang="nb-NO" sz="1100" dirty="0"/>
+          </a:p>
+        </p:txBody>
+      </p:sp>
+      <p:sp>
+        <p:nvSpPr>
+          <p:cNvPr id="54" name="TekstSylinder 53">
+            <a:extLst>
+              <a:ext uri="{FF2B5EF4-FFF2-40B4-BE49-F238E27FC236}">
+                <a16:creationId xmlns:a16="http://schemas.microsoft.com/office/drawing/2014/main" id="{FE2AE071-2427-4D7D-934D-057E36070F78}"/>
+              </a:ext>
+            </a:extLst>
+          </p:cNvPr>
+          <p:cNvSpPr txBox="1"/>
+          <p:nvPr/>
+        </p:nvSpPr>
+        <p:spPr>
+          <a:xfrm>
+            <a:off x="9827963" y="2513527"/>
+            <a:ext cx="1832553" cy="261610"/>
+          </a:xfrm>
+          <a:prstGeom prst="rect">
+            <a:avLst/>
+          </a:prstGeom>
+          <a:noFill/>
+        </p:spPr>
+        <p:txBody>
+          <a:bodyPr wrap="none" rtlCol="0">
+            <a:spAutoFit/>
+          </a:bodyPr>
+          <a:lstStyle/>
+          <a:p>
+            <a:pPr algn="ctr"/>
+            <a:r>
+              <a:rPr lang="nb-NO" sz="1100" dirty="0"/>
+              <a:t>imagepipeline-</a:t>
+            </a:r>
+            <a:r>
+              <a:rPr lang="nb-NO" sz="1100" dirty="0" err="1"/>
+              <a:t>colormatrix</a:t>
+            </a:r>
+            <a:r>
+              <a:rPr lang="nb-NO" sz="1100" dirty="0"/>
+              <a:t>-</a:t>
+            </a:r>
+            <a:r>
+              <a:rPr lang="nb-NO" sz="1100" dirty="0" err="1"/>
+              <a:t>lg</a:t>
+            </a:r>
+            <a:endParaRPr lang="nb-NO" sz="1100" dirty="0"/>
+          </a:p>
+        </p:txBody>
+      </p:sp>
+      <p:pic>
+        <p:nvPicPr>
+          <p:cNvPr id="58" name="Bilde 57">
+            <a:extLst>
+              <a:ext uri="{FF2B5EF4-FFF2-40B4-BE49-F238E27FC236}">
+                <a16:creationId xmlns:a16="http://schemas.microsoft.com/office/drawing/2014/main" id="{F4DB7F99-225C-49A9-AE66-E28B36932822}"/>
+              </a:ext>
+            </a:extLst>
+          </p:cNvPr>
+          <p:cNvPicPr>
+            <a:picLocks noChangeAspect="1"/>
+          </p:cNvPicPr>
+          <p:nvPr/>
+        </p:nvPicPr>
+        <p:blipFill>
+          <a:blip r:embed="rId3">
+            <a:extLst>
+              <a:ext uri="{28A0092B-C50C-407E-A947-70E740481C1C}">
+                <a14:useLocalDpi xmlns:a14="http://schemas.microsoft.com/office/drawing/2010/main" val="0"/>
+              </a:ext>
+            </a:extLst>
+          </a:blip>
+          <a:stretch>
+            <a:fillRect/>
+          </a:stretch>
+        </p:blipFill>
+        <p:spPr>
+          <a:xfrm>
+            <a:off x="9083894" y="2049638"/>
+            <a:ext cx="502591" cy="502591"/>
+          </a:xfrm>
+          <a:prstGeom prst="rect">
+            <a:avLst/>
+          </a:prstGeom>
+        </p:spPr>
+      </p:pic>
+      <p:pic>
+        <p:nvPicPr>
+          <p:cNvPr id="61" name="Bilde 60">
+            <a:extLst>
+              <a:ext uri="{FF2B5EF4-FFF2-40B4-BE49-F238E27FC236}">
+                <a16:creationId xmlns:a16="http://schemas.microsoft.com/office/drawing/2014/main" id="{D11D7E41-86E3-4D0B-844E-4334537DE256}"/>
+              </a:ext>
+            </a:extLst>
+          </p:cNvPr>
+          <p:cNvPicPr>
+            <a:picLocks noChangeAspect="1"/>
+          </p:cNvPicPr>
+          <p:nvPr/>
+        </p:nvPicPr>
+        <p:blipFill>
+          <a:blip r:embed="rId3">
+            <a:extLst>
+              <a:ext uri="{28A0092B-C50C-407E-A947-70E740481C1C}">
+                <a14:useLocalDpi xmlns:a14="http://schemas.microsoft.com/office/drawing/2010/main" val="0"/>
+              </a:ext>
+            </a:extLst>
+          </a:blip>
+          <a:stretch>
+            <a:fillRect/>
+          </a:stretch>
+        </p:blipFill>
+        <p:spPr>
+          <a:xfrm>
+            <a:off x="3897574" y="4448259"/>
+            <a:ext cx="502591" cy="502591"/>
+          </a:xfrm>
+          <a:prstGeom prst="rect">
+            <a:avLst/>
+          </a:prstGeom>
+        </p:spPr>
+      </p:pic>
+      <p:cxnSp>
+        <p:nvCxnSpPr>
+          <p:cNvPr id="62" name="Straight Arrow Connector 50">
+            <a:extLst>
+              <a:ext uri="{FF2B5EF4-FFF2-40B4-BE49-F238E27FC236}">
+                <a16:creationId xmlns:a16="http://schemas.microsoft.com/office/drawing/2014/main" id="{C7158C53-DE1A-4EC9-A93A-F733DA785D61}"/>
+              </a:ext>
+            </a:extLst>
+          </p:cNvPr>
+          <p:cNvCxnSpPr>
+            <a:cxnSpLocks/>
+          </p:cNvCxnSpPr>
+          <p:nvPr/>
+        </p:nvCxnSpPr>
+        <p:spPr>
+          <a:xfrm flipH="1">
+            <a:off x="4336449" y="3737753"/>
+            <a:ext cx="455300" cy="420928"/>
+          </a:xfrm>
+          <a:prstGeom prst="straightConnector1">
+            <a:avLst/>
+          </a:prstGeom>
+          <a:ln>
+            <a:tailEnd type="triangle"/>
+          </a:ln>
+          <a:effectLst>
+            <a:outerShdw blurRad="50800" dist="38100" dir="2700000" algn="tl" rotWithShape="0">
+              <a:prstClr val="black">
+                <a:alpha val="40000"/>
+              </a:prstClr>
+            </a:outerShdw>
+          </a:effectLst>
+        </p:spPr>
+        <p:style>
+          <a:lnRef idx="3">
+            <a:schemeClr val="accent2"/>
+          </a:lnRef>
+          <a:fillRef idx="0">
+            <a:schemeClr val="accent2"/>
+          </a:fillRef>
+          <a:effectRef idx="2">
+            <a:schemeClr val="accent2"/>
+          </a:effectRef>
+          <a:fontRef idx="minor">
+            <a:schemeClr val="tx1"/>
+          </a:fontRef>
+        </p:style>
+      </p:cxnSp>
+      <p:pic>
+        <p:nvPicPr>
+          <p:cNvPr id="65" name="Bilde 64">
+            <a:extLst>
+              <a:ext uri="{FF2B5EF4-FFF2-40B4-BE49-F238E27FC236}">
+                <a16:creationId xmlns:a16="http://schemas.microsoft.com/office/drawing/2014/main" id="{630426A1-8E35-456A-99D6-6CA68B88466C}"/>
+              </a:ext>
+            </a:extLst>
+          </p:cNvPr>
+          <p:cNvPicPr>
+            <a:picLocks noChangeAspect="1"/>
+          </p:cNvPicPr>
+          <p:nvPr/>
+        </p:nvPicPr>
+        <p:blipFill>
+          <a:blip r:embed="rId5">
+            <a:extLst>
+              <a:ext uri="{28A0092B-C50C-407E-A947-70E740481C1C}">
+                <a14:useLocalDpi xmlns:a14="http://schemas.microsoft.com/office/drawing/2010/main" val="0"/>
+              </a:ext>
+            </a:extLst>
+          </a:blip>
+          <a:stretch>
+            <a:fillRect/>
+          </a:stretch>
+        </p:blipFill>
+        <p:spPr>
+          <a:xfrm>
+            <a:off x="3919932" y="5467723"/>
+            <a:ext cx="502591" cy="502591"/>
+          </a:xfrm>
+          <a:prstGeom prst="rect">
+            <a:avLst/>
+          </a:prstGeom>
+        </p:spPr>
+      </p:pic>
+      <p:sp>
+        <p:nvSpPr>
+          <p:cNvPr id="66" name="TekstSylinder 65">
+            <a:extLst>
+              <a:ext uri="{FF2B5EF4-FFF2-40B4-BE49-F238E27FC236}">
+                <a16:creationId xmlns:a16="http://schemas.microsoft.com/office/drawing/2014/main" id="{5CE059B8-F142-44AF-A670-307C5C8D944A}"/>
+              </a:ext>
+            </a:extLst>
+          </p:cNvPr>
+          <p:cNvSpPr txBox="1"/>
+          <p:nvPr/>
+        </p:nvSpPr>
+        <p:spPr>
+          <a:xfrm>
+            <a:off x="3550704" y="5946867"/>
+            <a:ext cx="1241045" cy="261610"/>
+          </a:xfrm>
+          <a:prstGeom prst="rect">
+            <a:avLst/>
+          </a:prstGeom>
+          <a:noFill/>
+        </p:spPr>
+        <p:txBody>
+          <a:bodyPr wrap="none" rtlCol="0">
+            <a:spAutoFit/>
+          </a:bodyPr>
+          <a:lstStyle/>
+          <a:p>
+            <a:r>
+              <a:rPr lang="nb-NO" sz="1100" dirty="0"/>
+              <a:t>imagepipeline-</a:t>
+            </a:r>
+            <a:r>
+              <a:rPr lang="nb-NO" sz="1100" dirty="0" err="1"/>
+              <a:t>exif</a:t>
+            </a:r>
+            <a:endParaRPr lang="nb-NO" sz="1100" dirty="0"/>
+          </a:p>
+        </p:txBody>
+      </p:sp>
+      <p:pic>
+        <p:nvPicPr>
+          <p:cNvPr id="70" name="Bilde 69">
+            <a:extLst>
+              <a:ext uri="{FF2B5EF4-FFF2-40B4-BE49-F238E27FC236}">
+                <a16:creationId xmlns:a16="http://schemas.microsoft.com/office/drawing/2014/main" id="{549546FF-EFE4-4C72-9C23-7ED6CC1678B9}"/>
+              </a:ext>
+            </a:extLst>
+          </p:cNvPr>
+          <p:cNvPicPr>
+            <a:picLocks noChangeAspect="1"/>
+          </p:cNvPicPr>
+          <p:nvPr/>
+        </p:nvPicPr>
+        <p:blipFill>
+          <a:blip r:embed="rId3">
+            <a:extLst>
+              <a:ext uri="{28A0092B-C50C-407E-A947-70E740481C1C}">
+                <a14:useLocalDpi xmlns:a14="http://schemas.microsoft.com/office/drawing/2010/main" val="0"/>
+              </a:ext>
+            </a:extLst>
+          </a:blip>
+          <a:stretch>
+            <a:fillRect/>
+          </a:stretch>
+        </p:blipFill>
+        <p:spPr>
+          <a:xfrm>
+            <a:off x="5853111" y="4448259"/>
+            <a:ext cx="502591" cy="502591"/>
+          </a:xfrm>
+          <a:prstGeom prst="rect">
+            <a:avLst/>
+          </a:prstGeom>
+        </p:spPr>
+      </p:pic>
+      <p:pic>
+        <p:nvPicPr>
+          <p:cNvPr id="71" name="Bilde 70">
+            <a:extLst>
+              <a:ext uri="{FF2B5EF4-FFF2-40B4-BE49-F238E27FC236}">
+                <a16:creationId xmlns:a16="http://schemas.microsoft.com/office/drawing/2014/main" id="{6F58B2FF-69B9-49C6-9CDD-7A475661247A}"/>
+              </a:ext>
+            </a:extLst>
+          </p:cNvPr>
+          <p:cNvPicPr>
+            <a:picLocks noChangeAspect="1"/>
+          </p:cNvPicPr>
+          <p:nvPr/>
+        </p:nvPicPr>
+        <p:blipFill>
+          <a:blip r:embed="rId5">
+            <a:extLst>
+              <a:ext uri="{28A0092B-C50C-407E-A947-70E740481C1C}">
+                <a14:useLocalDpi xmlns:a14="http://schemas.microsoft.com/office/drawing/2010/main" val="0"/>
+              </a:ext>
+            </a:extLst>
+          </a:blip>
+          <a:stretch>
+            <a:fillRect/>
+          </a:stretch>
+        </p:blipFill>
+        <p:spPr>
+          <a:xfrm>
+            <a:off x="5846567" y="5458004"/>
+            <a:ext cx="502591" cy="502591"/>
+          </a:xfrm>
+          <a:prstGeom prst="rect">
+            <a:avLst/>
+          </a:prstGeom>
+        </p:spPr>
+      </p:pic>
+      <p:sp>
+        <p:nvSpPr>
+          <p:cNvPr id="72" name="TekstSylinder 71">
+            <a:extLst>
+              <a:ext uri="{FF2B5EF4-FFF2-40B4-BE49-F238E27FC236}">
+                <a16:creationId xmlns:a16="http://schemas.microsoft.com/office/drawing/2014/main" id="{3067D8D1-B1A2-4657-95DE-A03E62BB347B}"/>
+              </a:ext>
+            </a:extLst>
+          </p:cNvPr>
+          <p:cNvSpPr txBox="1"/>
+          <p:nvPr/>
+        </p:nvSpPr>
+        <p:spPr>
+          <a:xfrm>
+            <a:off x="5092359" y="5943817"/>
+            <a:ext cx="2007281" cy="261610"/>
+          </a:xfrm>
+          <a:prstGeom prst="rect">
+            <a:avLst/>
+          </a:prstGeom>
+          <a:noFill/>
+        </p:spPr>
+        <p:txBody>
+          <a:bodyPr wrap="none" rtlCol="0">
+            <a:spAutoFit/>
+          </a:bodyPr>
+          <a:lstStyle/>
+          <a:p>
+            <a:r>
+              <a:rPr lang="nb-NO" sz="1100" dirty="0"/>
+              <a:t>imagepipeline-</a:t>
+            </a:r>
+            <a:r>
+              <a:rPr lang="nb-NO" sz="1100" dirty="0" err="1"/>
+              <a:t>cognitiveservices</a:t>
+            </a:r>
+            <a:endParaRPr lang="nb-NO" sz="1100" dirty="0"/>
+          </a:p>
+        </p:txBody>
+      </p:sp>
+      <p:cxnSp>
+        <p:nvCxnSpPr>
+          <p:cNvPr id="73" name="Straight Arrow Connector 50">
+            <a:extLst>
+              <a:ext uri="{FF2B5EF4-FFF2-40B4-BE49-F238E27FC236}">
+                <a16:creationId xmlns:a16="http://schemas.microsoft.com/office/drawing/2014/main" id="{40EBCAB2-338F-40E5-B408-D0B324787BDD}"/>
+              </a:ext>
+            </a:extLst>
+          </p:cNvPr>
+          <p:cNvCxnSpPr>
+            <a:cxnSpLocks/>
+          </p:cNvCxnSpPr>
+          <p:nvPr/>
+        </p:nvCxnSpPr>
+        <p:spPr>
+          <a:xfrm flipH="1">
+            <a:off x="6087376" y="4981113"/>
+            <a:ext cx="8624" cy="451723"/>
+          </a:xfrm>
+          <a:prstGeom prst="straightConnector1">
+            <a:avLst/>
+          </a:prstGeom>
+          <a:ln>
+            <a:tailEnd type="triangle"/>
+          </a:ln>
+          <a:effectLst>
+            <a:outerShdw blurRad="50800" dist="38100" dir="2700000" algn="tl" rotWithShape="0">
+              <a:prstClr val="black">
+                <a:alpha val="40000"/>
+              </a:prstClr>
+            </a:outerShdw>
+          </a:effectLst>
+        </p:spPr>
+        <p:style>
+          <a:lnRef idx="3">
+            <a:schemeClr val="accent2"/>
+          </a:lnRef>
+          <a:fillRef idx="0">
+            <a:schemeClr val="accent2"/>
+          </a:fillRef>
+          <a:effectRef idx="2">
+            <a:schemeClr val="accent2"/>
+          </a:effectRef>
+          <a:fontRef idx="minor">
+            <a:schemeClr val="tx1"/>
+          </a:fontRef>
+        </p:style>
+      </p:cxnSp>
+      <p:cxnSp>
+        <p:nvCxnSpPr>
+          <p:cNvPr id="75" name="Straight Arrow Connector 50">
+            <a:extLst>
+              <a:ext uri="{FF2B5EF4-FFF2-40B4-BE49-F238E27FC236}">
+                <a16:creationId xmlns:a16="http://schemas.microsoft.com/office/drawing/2014/main" id="{3EB9A3BD-E1F3-4FAD-9761-18417D150C7D}"/>
+              </a:ext>
+            </a:extLst>
+          </p:cNvPr>
+          <p:cNvCxnSpPr>
+            <a:cxnSpLocks/>
+          </p:cNvCxnSpPr>
+          <p:nvPr/>
+        </p:nvCxnSpPr>
+        <p:spPr>
+          <a:xfrm flipV="1">
+            <a:off x="8246250" y="2284082"/>
+            <a:ext cx="641133" cy="1"/>
+          </a:xfrm>
+          <a:prstGeom prst="straightConnector1">
+            <a:avLst/>
+          </a:prstGeom>
+          <a:ln>
+            <a:tailEnd type="triangle"/>
+          </a:ln>
+          <a:effectLst>
+            <a:outerShdw blurRad="50800" dist="38100" dir="2700000" algn="tl" rotWithShape="0">
+              <a:prstClr val="black">
+                <a:alpha val="40000"/>
+              </a:prstClr>
+            </a:outerShdw>
+          </a:effectLst>
+        </p:spPr>
+        <p:style>
+          <a:lnRef idx="3">
+            <a:schemeClr val="accent2"/>
+          </a:lnRef>
+          <a:fillRef idx="0">
+            <a:schemeClr val="accent2"/>
+          </a:fillRef>
+          <a:effectRef idx="2">
+            <a:schemeClr val="accent2"/>
+          </a:effectRef>
+          <a:fontRef idx="minor">
+            <a:schemeClr val="tx1"/>
+          </a:fontRef>
+        </p:style>
+      </p:cxnSp>
+      <p:cxnSp>
+        <p:nvCxnSpPr>
+          <p:cNvPr id="76" name="Straight Arrow Connector 50">
+            <a:extLst>
+              <a:ext uri="{FF2B5EF4-FFF2-40B4-BE49-F238E27FC236}">
+                <a16:creationId xmlns:a16="http://schemas.microsoft.com/office/drawing/2014/main" id="{0458FF41-EFFE-4E6A-87F1-AB392E084FCC}"/>
+              </a:ext>
+            </a:extLst>
+          </p:cNvPr>
+          <p:cNvCxnSpPr>
+            <a:cxnSpLocks/>
+          </p:cNvCxnSpPr>
+          <p:nvPr/>
+        </p:nvCxnSpPr>
+        <p:spPr>
+          <a:xfrm>
+            <a:off x="6822440" y="3175814"/>
+            <a:ext cx="697459" cy="0"/>
+          </a:xfrm>
+          <a:prstGeom prst="straightConnector1">
+            <a:avLst/>
+          </a:prstGeom>
+          <a:ln>
+            <a:tailEnd type="triangle"/>
+          </a:ln>
+          <a:effectLst>
+            <a:outerShdw blurRad="50800" dist="38100" dir="2700000" algn="tl" rotWithShape="0">
+              <a:prstClr val="black">
+                <a:alpha val="40000"/>
+              </a:prstClr>
+            </a:outerShdw>
+          </a:effectLst>
+        </p:spPr>
+        <p:style>
+          <a:lnRef idx="3">
+            <a:schemeClr val="accent2"/>
+          </a:lnRef>
+          <a:fillRef idx="0">
+            <a:schemeClr val="accent2"/>
+          </a:fillRef>
+          <a:effectRef idx="2">
+            <a:schemeClr val="accent2"/>
+          </a:effectRef>
+          <a:fontRef idx="minor">
+            <a:schemeClr val="tx1"/>
+          </a:fontRef>
+        </p:style>
+      </p:cxnSp>
+      <p:sp>
+        <p:nvSpPr>
+          <p:cNvPr id="44" name="TekstSylinder 43">
+            <a:extLst>
+              <a:ext uri="{FF2B5EF4-FFF2-40B4-BE49-F238E27FC236}">
+                <a16:creationId xmlns:a16="http://schemas.microsoft.com/office/drawing/2014/main" id="{80D05FB6-7498-41D9-A44A-6CA2EA2D75E5}"/>
+              </a:ext>
+            </a:extLst>
+          </p:cNvPr>
+          <p:cNvSpPr txBox="1"/>
+          <p:nvPr/>
+        </p:nvSpPr>
+        <p:spPr>
+          <a:xfrm>
+            <a:off x="7126113" y="3441967"/>
+            <a:ext cx="1620957" cy="261610"/>
+          </a:xfrm>
+          <a:prstGeom prst="rect">
+            <a:avLst/>
+          </a:prstGeom>
+          <a:solidFill>
+            <a:schemeClr val="bg1"/>
+          </a:solidFill>
+        </p:spPr>
+        <p:txBody>
+          <a:bodyPr wrap="none" rtlCol="0">
+            <a:spAutoFit/>
+          </a:bodyPr>
+          <a:lstStyle/>
+          <a:p>
+            <a:pPr algn="ctr"/>
+            <a:r>
+              <a:rPr lang="nb-NO" sz="1100" dirty="0"/>
+              <a:t>imagepipeline-</a:t>
+            </a:r>
+            <a:r>
+              <a:rPr lang="nb-NO" sz="1100" dirty="0" err="1"/>
+              <a:t>scaled</a:t>
+            </a:r>
+            <a:r>
+              <a:rPr lang="nb-NO" sz="1100" dirty="0"/>
+              <a:t>-md</a:t>
+            </a:r>
+          </a:p>
+        </p:txBody>
+      </p:sp>
+      <p:sp>
+        <p:nvSpPr>
+          <p:cNvPr id="46" name="TekstSylinder 45">
+            <a:extLst>
+              <a:ext uri="{FF2B5EF4-FFF2-40B4-BE49-F238E27FC236}">
+                <a16:creationId xmlns:a16="http://schemas.microsoft.com/office/drawing/2014/main" id="{CA82975A-61FE-4DDF-A359-AD9792B622AC}"/>
+              </a:ext>
+            </a:extLst>
+          </p:cNvPr>
+          <p:cNvSpPr txBox="1"/>
+          <p:nvPr/>
+        </p:nvSpPr>
+        <p:spPr>
+          <a:xfrm>
+            <a:off x="7162483" y="4361733"/>
+            <a:ext cx="1601721" cy="261610"/>
+          </a:xfrm>
+          <a:prstGeom prst="rect">
+            <a:avLst/>
+          </a:prstGeom>
+          <a:solidFill>
+            <a:schemeClr val="bg1"/>
+          </a:solidFill>
+        </p:spPr>
+        <p:txBody>
+          <a:bodyPr wrap="none" rtlCol="0">
+            <a:spAutoFit/>
+          </a:bodyPr>
+          <a:lstStyle/>
+          <a:p>
+            <a:pPr algn="ctr"/>
+            <a:r>
+              <a:rPr lang="nb-NO" sz="1100" dirty="0"/>
+              <a:t>imagepipeline-</a:t>
+            </a:r>
+            <a:r>
+              <a:rPr lang="nb-NO" sz="1100" dirty="0" err="1"/>
+              <a:t>scaled</a:t>
+            </a:r>
+            <a:r>
+              <a:rPr lang="nb-NO" sz="1100" dirty="0"/>
+              <a:t>-</a:t>
+            </a:r>
+            <a:r>
+              <a:rPr lang="nb-NO" sz="1100" dirty="0" err="1"/>
+              <a:t>sm</a:t>
+            </a:r>
+            <a:endParaRPr lang="nb-NO" sz="1100" dirty="0"/>
+          </a:p>
+        </p:txBody>
+      </p:sp>
+      <p:sp>
+        <p:nvSpPr>
+          <p:cNvPr id="47" name="TekstSylinder 46">
+            <a:extLst>
+              <a:ext uri="{FF2B5EF4-FFF2-40B4-BE49-F238E27FC236}">
+                <a16:creationId xmlns:a16="http://schemas.microsoft.com/office/drawing/2014/main" id="{7EA3F2D0-16B6-4B1C-88B1-E26908D38C47}"/>
+              </a:ext>
+            </a:extLst>
+          </p:cNvPr>
+          <p:cNvSpPr txBox="1"/>
+          <p:nvPr/>
+        </p:nvSpPr>
+        <p:spPr>
+          <a:xfrm>
+            <a:off x="7170196" y="2522159"/>
+            <a:ext cx="1532792" cy="261610"/>
+          </a:xfrm>
+          <a:prstGeom prst="rect">
+            <a:avLst/>
+          </a:prstGeom>
+          <a:solidFill>
+            <a:schemeClr val="bg1"/>
+          </a:solidFill>
+        </p:spPr>
+        <p:txBody>
+          <a:bodyPr wrap="none" rtlCol="0">
+            <a:spAutoFit/>
+          </a:bodyPr>
+          <a:lstStyle/>
+          <a:p>
+            <a:pPr algn="ctr"/>
+            <a:r>
+              <a:rPr lang="nb-NO" sz="1100" dirty="0"/>
+              <a:t>imagepipeline-</a:t>
+            </a:r>
+            <a:r>
+              <a:rPr lang="nb-NO" sz="1100" dirty="0" err="1"/>
+              <a:t>scaled</a:t>
+            </a:r>
+            <a:r>
+              <a:rPr lang="nb-NO" sz="1100" dirty="0"/>
+              <a:t>-</a:t>
+            </a:r>
+            <a:r>
+              <a:rPr lang="nb-NO" sz="1100" dirty="0" err="1"/>
+              <a:t>lg</a:t>
+            </a:r>
+            <a:endParaRPr lang="nb-NO" sz="1100" dirty="0"/>
+          </a:p>
+        </p:txBody>
+      </p:sp>
+      <p:cxnSp>
+        <p:nvCxnSpPr>
+          <p:cNvPr id="91" name="Straight Arrow Connector 50">
+            <a:extLst>
+              <a:ext uri="{FF2B5EF4-FFF2-40B4-BE49-F238E27FC236}">
+                <a16:creationId xmlns:a16="http://schemas.microsoft.com/office/drawing/2014/main" id="{F76F45E8-B29A-4154-B788-6110D14E182F}"/>
+              </a:ext>
+            </a:extLst>
+          </p:cNvPr>
+          <p:cNvCxnSpPr>
+            <a:cxnSpLocks/>
+          </p:cNvCxnSpPr>
+          <p:nvPr/>
+        </p:nvCxnSpPr>
+        <p:spPr>
+          <a:xfrm>
+            <a:off x="9678864" y="2284082"/>
+            <a:ext cx="674758" cy="0"/>
+          </a:xfrm>
+          <a:prstGeom prst="straightConnector1">
+            <a:avLst/>
+          </a:prstGeom>
+          <a:ln>
+            <a:tailEnd type="triangle"/>
+          </a:ln>
+          <a:effectLst>
+            <a:outerShdw blurRad="50800" dist="38100" dir="2700000" algn="tl" rotWithShape="0">
+              <a:prstClr val="black">
+                <a:alpha val="40000"/>
+              </a:prstClr>
+            </a:outerShdw>
+          </a:effectLst>
+        </p:spPr>
+        <p:style>
+          <a:lnRef idx="3">
+            <a:schemeClr val="accent2"/>
+          </a:lnRef>
+          <a:fillRef idx="0">
+            <a:schemeClr val="accent2"/>
+          </a:fillRef>
+          <a:effectRef idx="2">
+            <a:schemeClr val="accent2"/>
+          </a:effectRef>
+          <a:fontRef idx="minor">
+            <a:schemeClr val="tx1"/>
+          </a:fontRef>
+        </p:style>
+      </p:cxnSp>
+      <p:sp>
+        <p:nvSpPr>
+          <p:cNvPr id="96" name="TekstSylinder 95">
+            <a:extLst>
+              <a:ext uri="{FF2B5EF4-FFF2-40B4-BE49-F238E27FC236}">
+                <a16:creationId xmlns:a16="http://schemas.microsoft.com/office/drawing/2014/main" id="{54250C21-F2A4-48F7-BE0E-909943F32C8A}"/>
+              </a:ext>
+            </a:extLst>
+          </p:cNvPr>
+          <p:cNvSpPr txBox="1"/>
+          <p:nvPr/>
+        </p:nvSpPr>
+        <p:spPr>
+          <a:xfrm>
+            <a:off x="4316693" y="3419735"/>
+            <a:ext cx="1515159" cy="261610"/>
+          </a:xfrm>
+          <a:prstGeom prst="rect">
+            <a:avLst/>
+          </a:prstGeom>
+          <a:solidFill>
+            <a:schemeClr val="bg1"/>
+          </a:solidFill>
+        </p:spPr>
+        <p:txBody>
+          <a:bodyPr wrap="none" rtlCol="0">
+            <a:spAutoFit/>
+          </a:bodyPr>
+          <a:lstStyle/>
+          <a:p>
+            <a:pPr algn="ctr"/>
+            <a:r>
+              <a:rPr lang="nb-NO" sz="1100" dirty="0"/>
+              <a:t>imagepipeline-originals</a:t>
+            </a:r>
+          </a:p>
+        </p:txBody>
+      </p:sp>
+      <p:sp>
+        <p:nvSpPr>
+          <p:cNvPr id="98" name="TekstSylinder 97">
+            <a:extLst>
+              <a:ext uri="{FF2B5EF4-FFF2-40B4-BE49-F238E27FC236}">
+                <a16:creationId xmlns:a16="http://schemas.microsoft.com/office/drawing/2014/main" id="{C2258790-BC50-4D6E-9C32-EDE35D028BF5}"/>
+              </a:ext>
+            </a:extLst>
+          </p:cNvPr>
+          <p:cNvSpPr txBox="1"/>
+          <p:nvPr/>
+        </p:nvSpPr>
+        <p:spPr>
+          <a:xfrm>
+            <a:off x="3325217" y="2714320"/>
+            <a:ext cx="588624" cy="261610"/>
+          </a:xfrm>
+          <a:prstGeom prst="rect">
+            <a:avLst/>
+          </a:prstGeom>
+          <a:solidFill>
+            <a:schemeClr val="bg1"/>
+          </a:solidFill>
+        </p:spPr>
+        <p:txBody>
+          <a:bodyPr wrap="none" rtlCol="0">
+            <a:spAutoFit/>
+          </a:bodyPr>
+          <a:lstStyle/>
+          <a:p>
+            <a:pPr algn="ctr"/>
+            <a:r>
+              <a:rPr lang="nb-NO" sz="1100" dirty="0"/>
+              <a:t>Ingress</a:t>
+            </a:r>
+          </a:p>
+        </p:txBody>
+      </p:sp>
+      <p:sp>
+        <p:nvSpPr>
+          <p:cNvPr id="99" name="TekstSylinder 98">
+            <a:extLst>
+              <a:ext uri="{FF2B5EF4-FFF2-40B4-BE49-F238E27FC236}">
+                <a16:creationId xmlns:a16="http://schemas.microsoft.com/office/drawing/2014/main" id="{BED47FE8-2D8C-4E9D-A872-FB65EC544534}"/>
+              </a:ext>
+            </a:extLst>
+          </p:cNvPr>
+          <p:cNvSpPr txBox="1"/>
+          <p:nvPr/>
+        </p:nvSpPr>
+        <p:spPr>
+          <a:xfrm>
+            <a:off x="6191042" y="2719502"/>
+            <a:ext cx="527709" cy="261610"/>
+          </a:xfrm>
+          <a:prstGeom prst="rect">
+            <a:avLst/>
+          </a:prstGeom>
+          <a:solidFill>
+            <a:schemeClr val="bg1"/>
+          </a:solidFill>
+        </p:spPr>
+        <p:txBody>
+          <a:bodyPr wrap="none" rtlCol="0">
+            <a:spAutoFit/>
+          </a:bodyPr>
+          <a:lstStyle/>
+          <a:p>
+            <a:pPr algn="ctr"/>
+            <a:r>
+              <a:rPr lang="nb-NO" sz="1100" dirty="0" err="1"/>
+              <a:t>Scaler</a:t>
+            </a:r>
+            <a:endParaRPr lang="nb-NO" sz="1100" dirty="0"/>
+          </a:p>
+        </p:txBody>
+      </p:sp>
+      <p:sp>
+        <p:nvSpPr>
+          <p:cNvPr id="100" name="TekstSylinder 99">
+            <a:extLst>
+              <a:ext uri="{FF2B5EF4-FFF2-40B4-BE49-F238E27FC236}">
+                <a16:creationId xmlns:a16="http://schemas.microsoft.com/office/drawing/2014/main" id="{462B70FA-6792-4606-8940-9AE813BC3C39}"/>
+              </a:ext>
+            </a:extLst>
+          </p:cNvPr>
+          <p:cNvSpPr txBox="1"/>
+          <p:nvPr/>
+        </p:nvSpPr>
+        <p:spPr>
+          <a:xfrm>
+            <a:off x="3970040" y="4211067"/>
+            <a:ext cx="389850" cy="261610"/>
+          </a:xfrm>
+          <a:prstGeom prst="rect">
+            <a:avLst/>
+          </a:prstGeom>
+          <a:solidFill>
+            <a:schemeClr val="bg1"/>
+          </a:solidFill>
+        </p:spPr>
+        <p:txBody>
+          <a:bodyPr wrap="none" rtlCol="0">
+            <a:spAutoFit/>
+          </a:bodyPr>
+          <a:lstStyle/>
+          <a:p>
+            <a:pPr algn="ctr"/>
+            <a:r>
+              <a:rPr lang="nb-NO" sz="1100" dirty="0" err="1"/>
+              <a:t>Exif</a:t>
+            </a:r>
+            <a:endParaRPr lang="nb-NO" sz="1100" dirty="0"/>
+          </a:p>
+        </p:txBody>
+      </p:sp>
+      <p:sp>
+        <p:nvSpPr>
+          <p:cNvPr id="101" name="TekstSylinder 100">
+            <a:extLst>
+              <a:ext uri="{FF2B5EF4-FFF2-40B4-BE49-F238E27FC236}">
+                <a16:creationId xmlns:a16="http://schemas.microsoft.com/office/drawing/2014/main" id="{282DABD1-97DA-41DC-A3EA-636AB01F4796}"/>
+              </a:ext>
+            </a:extLst>
+          </p:cNvPr>
+          <p:cNvSpPr txBox="1"/>
+          <p:nvPr/>
+        </p:nvSpPr>
+        <p:spPr>
+          <a:xfrm>
+            <a:off x="5505403" y="4217637"/>
+            <a:ext cx="1183337" cy="261610"/>
+          </a:xfrm>
+          <a:prstGeom prst="rect">
+            <a:avLst/>
+          </a:prstGeom>
+          <a:solidFill>
+            <a:schemeClr val="bg1"/>
+          </a:solidFill>
+        </p:spPr>
+        <p:txBody>
+          <a:bodyPr wrap="none" rtlCol="0">
+            <a:spAutoFit/>
+          </a:bodyPr>
+          <a:lstStyle/>
+          <a:p>
+            <a:pPr algn="ctr"/>
+            <a:r>
+              <a:rPr lang="nb-NO" sz="1100" dirty="0" err="1"/>
+              <a:t>CognitiveServices</a:t>
+            </a:r>
+            <a:endParaRPr lang="nb-NO" sz="1100" dirty="0"/>
+          </a:p>
+        </p:txBody>
+      </p:sp>
+      <p:sp>
+        <p:nvSpPr>
+          <p:cNvPr id="109" name="TekstSylinder 108">
+            <a:extLst>
+              <a:ext uri="{FF2B5EF4-FFF2-40B4-BE49-F238E27FC236}">
+                <a16:creationId xmlns:a16="http://schemas.microsoft.com/office/drawing/2014/main" id="{EECA1804-7049-4761-A71F-6AC7957F26A6}"/>
+              </a:ext>
+            </a:extLst>
+          </p:cNvPr>
+          <p:cNvSpPr txBox="1"/>
+          <p:nvPr/>
+        </p:nvSpPr>
+        <p:spPr>
+          <a:xfrm>
+            <a:off x="8745925" y="1808666"/>
+            <a:ext cx="1178529" cy="261610"/>
+          </a:xfrm>
+          <a:prstGeom prst="rect">
+            <a:avLst/>
+          </a:prstGeom>
+          <a:solidFill>
+            <a:schemeClr val="bg1"/>
+          </a:solidFill>
+        </p:spPr>
+        <p:txBody>
+          <a:bodyPr wrap="none" rtlCol="0">
+            <a:spAutoFit/>
+          </a:bodyPr>
+          <a:lstStyle/>
+          <a:p>
+            <a:pPr algn="ctr"/>
+            <a:r>
+              <a:rPr lang="nb-NO" sz="1100" dirty="0" err="1"/>
+              <a:t>ColorMatrixLarge</a:t>
+            </a:r>
+            <a:endParaRPr lang="nb-NO" sz="1100" dirty="0"/>
+          </a:p>
+        </p:txBody>
+      </p:sp>
+      <p:pic>
+        <p:nvPicPr>
+          <p:cNvPr id="124" name="Bilde 123">
+            <a:extLst>
+              <a:ext uri="{FF2B5EF4-FFF2-40B4-BE49-F238E27FC236}">
+                <a16:creationId xmlns:a16="http://schemas.microsoft.com/office/drawing/2014/main" id="{7393080C-B82A-449A-89D6-7C2C6B8B54F3}"/>
+              </a:ext>
+            </a:extLst>
+          </p:cNvPr>
+          <p:cNvPicPr>
+            <a:picLocks noChangeAspect="1"/>
+          </p:cNvPicPr>
+          <p:nvPr/>
+        </p:nvPicPr>
+        <p:blipFill>
+          <a:blip r:embed="rId3">
+            <a:extLst>
+              <a:ext uri="{28A0092B-C50C-407E-A947-70E740481C1C}">
+                <a14:useLocalDpi xmlns:a14="http://schemas.microsoft.com/office/drawing/2010/main" val="0"/>
+              </a:ext>
+            </a:extLst>
+          </a:blip>
+          <a:stretch>
+            <a:fillRect/>
+          </a:stretch>
+        </p:blipFill>
+        <p:spPr>
+          <a:xfrm>
+            <a:off x="9083894" y="2959089"/>
+            <a:ext cx="502591" cy="502591"/>
+          </a:xfrm>
+          <a:prstGeom prst="rect">
+            <a:avLst/>
+          </a:prstGeom>
+        </p:spPr>
+      </p:pic>
+      <p:cxnSp>
+        <p:nvCxnSpPr>
+          <p:cNvPr id="126" name="Straight Arrow Connector 50">
+            <a:extLst>
+              <a:ext uri="{FF2B5EF4-FFF2-40B4-BE49-F238E27FC236}">
+                <a16:creationId xmlns:a16="http://schemas.microsoft.com/office/drawing/2014/main" id="{B16BBB71-134D-43B9-8C4B-E68B390CEE2F}"/>
+              </a:ext>
+            </a:extLst>
+          </p:cNvPr>
+          <p:cNvCxnSpPr>
+            <a:cxnSpLocks/>
+          </p:cNvCxnSpPr>
+          <p:nvPr/>
+        </p:nvCxnSpPr>
+        <p:spPr>
+          <a:xfrm>
+            <a:off x="9706774" y="3193533"/>
+            <a:ext cx="674758" cy="0"/>
+          </a:xfrm>
+          <a:prstGeom prst="straightConnector1">
+            <a:avLst/>
+          </a:prstGeom>
+          <a:ln>
+            <a:tailEnd type="triangle"/>
+          </a:ln>
+          <a:effectLst>
+            <a:outerShdw blurRad="50800" dist="38100" dir="2700000" algn="tl" rotWithShape="0">
+              <a:prstClr val="black">
+                <a:alpha val="40000"/>
+              </a:prstClr>
+            </a:outerShdw>
+          </a:effectLst>
+        </p:spPr>
+        <p:style>
+          <a:lnRef idx="3">
+            <a:schemeClr val="accent2"/>
+          </a:lnRef>
+          <a:fillRef idx="0">
+            <a:schemeClr val="accent2"/>
+          </a:fillRef>
+          <a:effectRef idx="2">
+            <a:schemeClr val="accent2"/>
+          </a:effectRef>
+          <a:fontRef idx="minor">
+            <a:schemeClr val="tx1"/>
+          </a:fontRef>
+        </p:style>
+      </p:cxnSp>
+      <p:sp>
+        <p:nvSpPr>
+          <p:cNvPr id="127" name="TekstSylinder 126">
+            <a:extLst>
+              <a:ext uri="{FF2B5EF4-FFF2-40B4-BE49-F238E27FC236}">
+                <a16:creationId xmlns:a16="http://schemas.microsoft.com/office/drawing/2014/main" id="{2D619D79-B1AE-4FF7-9BB1-619E6DDCD753}"/>
+              </a:ext>
+            </a:extLst>
+          </p:cNvPr>
+          <p:cNvSpPr txBox="1"/>
+          <p:nvPr/>
+        </p:nvSpPr>
+        <p:spPr>
+          <a:xfrm>
+            <a:off x="8660966" y="2718117"/>
+            <a:ext cx="1348447" cy="261610"/>
+          </a:xfrm>
+          <a:prstGeom prst="rect">
+            <a:avLst/>
+          </a:prstGeom>
+          <a:solidFill>
+            <a:schemeClr val="bg1"/>
+          </a:solidFill>
+        </p:spPr>
+        <p:txBody>
+          <a:bodyPr wrap="none" rtlCol="0">
+            <a:spAutoFit/>
+          </a:bodyPr>
+          <a:lstStyle/>
+          <a:p>
+            <a:pPr algn="ctr"/>
+            <a:r>
+              <a:rPr lang="nb-NO" sz="1100" dirty="0" err="1"/>
+              <a:t>ColorMatrixMedium</a:t>
+            </a:r>
+            <a:endParaRPr lang="nb-NO" sz="1100" dirty="0"/>
+          </a:p>
+        </p:txBody>
+      </p:sp>
+      <p:pic>
+        <p:nvPicPr>
+          <p:cNvPr id="128" name="Bilde 127">
+            <a:extLst>
+              <a:ext uri="{FF2B5EF4-FFF2-40B4-BE49-F238E27FC236}">
+                <a16:creationId xmlns:a16="http://schemas.microsoft.com/office/drawing/2014/main" id="{9A6289C1-AE42-4FFA-BCC2-ED6FBD1CE05E}"/>
+              </a:ext>
+            </a:extLst>
+          </p:cNvPr>
+          <p:cNvPicPr>
+            <a:picLocks noChangeAspect="1"/>
+          </p:cNvPicPr>
+          <p:nvPr/>
+        </p:nvPicPr>
+        <p:blipFill>
+          <a:blip r:embed="rId3">
+            <a:extLst>
+              <a:ext uri="{28A0092B-C50C-407E-A947-70E740481C1C}">
+                <a14:useLocalDpi xmlns:a14="http://schemas.microsoft.com/office/drawing/2010/main" val="0"/>
+              </a:ext>
+            </a:extLst>
+          </a:blip>
+          <a:stretch>
+            <a:fillRect/>
+          </a:stretch>
+        </p:blipFill>
+        <p:spPr>
+          <a:xfrm>
+            <a:off x="9083894" y="3907932"/>
+            <a:ext cx="502591" cy="502591"/>
+          </a:xfrm>
+          <a:prstGeom prst="rect">
+            <a:avLst/>
+          </a:prstGeom>
+        </p:spPr>
+      </p:pic>
+      <p:cxnSp>
+        <p:nvCxnSpPr>
+          <p:cNvPr id="130" name="Straight Arrow Connector 50">
+            <a:extLst>
+              <a:ext uri="{FF2B5EF4-FFF2-40B4-BE49-F238E27FC236}">
+                <a16:creationId xmlns:a16="http://schemas.microsoft.com/office/drawing/2014/main" id="{0D76C81C-F8EE-4CDE-966A-DDAB1A24B205}"/>
+              </a:ext>
+            </a:extLst>
+          </p:cNvPr>
+          <p:cNvCxnSpPr>
+            <a:cxnSpLocks/>
+          </p:cNvCxnSpPr>
+          <p:nvPr/>
+        </p:nvCxnSpPr>
+        <p:spPr>
+          <a:xfrm>
+            <a:off x="9739042" y="4142376"/>
+            <a:ext cx="674758" cy="0"/>
+          </a:xfrm>
+          <a:prstGeom prst="straightConnector1">
+            <a:avLst/>
+          </a:prstGeom>
+          <a:ln>
+            <a:tailEnd type="triangle"/>
+          </a:ln>
+          <a:effectLst>
+            <a:outerShdw blurRad="50800" dist="38100" dir="2700000" algn="tl" rotWithShape="0">
+              <a:prstClr val="black">
+                <a:alpha val="40000"/>
+              </a:prstClr>
+            </a:outerShdw>
+          </a:effectLst>
+        </p:spPr>
+        <p:style>
+          <a:lnRef idx="3">
+            <a:schemeClr val="accent2"/>
+          </a:lnRef>
+          <a:fillRef idx="0">
+            <a:schemeClr val="accent2"/>
+          </a:fillRef>
+          <a:effectRef idx="2">
+            <a:schemeClr val="accent2"/>
+          </a:effectRef>
+          <a:fontRef idx="minor">
+            <a:schemeClr val="tx1"/>
+          </a:fontRef>
+        </p:style>
+      </p:cxnSp>
+      <p:sp>
+        <p:nvSpPr>
+          <p:cNvPr id="131" name="TekstSylinder 130">
+            <a:extLst>
+              <a:ext uri="{FF2B5EF4-FFF2-40B4-BE49-F238E27FC236}">
+                <a16:creationId xmlns:a16="http://schemas.microsoft.com/office/drawing/2014/main" id="{FECDFC41-EAE2-4775-AAC8-9A9F6E061CBE}"/>
+              </a:ext>
+            </a:extLst>
+          </p:cNvPr>
+          <p:cNvSpPr txBox="1"/>
+          <p:nvPr/>
+        </p:nvSpPr>
+        <p:spPr>
+          <a:xfrm>
+            <a:off x="8748330" y="3666960"/>
+            <a:ext cx="1173719" cy="261610"/>
+          </a:xfrm>
+          <a:prstGeom prst="rect">
+            <a:avLst/>
+          </a:prstGeom>
+          <a:solidFill>
+            <a:schemeClr val="bg1"/>
+          </a:solidFill>
+        </p:spPr>
+        <p:txBody>
+          <a:bodyPr wrap="none" rtlCol="0">
+            <a:spAutoFit/>
+          </a:bodyPr>
+          <a:lstStyle/>
+          <a:p>
+            <a:pPr algn="ctr"/>
+            <a:r>
+              <a:rPr lang="nb-NO" sz="1100" dirty="0" err="1"/>
+              <a:t>ColorMatrixSmall</a:t>
+            </a:r>
+            <a:endParaRPr lang="nb-NO" sz="1100" dirty="0"/>
+          </a:p>
+        </p:txBody>
+      </p:sp>
+      <p:cxnSp>
+        <p:nvCxnSpPr>
+          <p:cNvPr id="146" name="Straight Arrow Connector 50">
+            <a:extLst>
+              <a:ext uri="{FF2B5EF4-FFF2-40B4-BE49-F238E27FC236}">
+                <a16:creationId xmlns:a16="http://schemas.microsoft.com/office/drawing/2014/main" id="{6E60E85F-54F7-4961-B0BB-71E0BD8400CF}"/>
+              </a:ext>
+            </a:extLst>
+          </p:cNvPr>
+          <p:cNvCxnSpPr>
+            <a:cxnSpLocks/>
+          </p:cNvCxnSpPr>
+          <p:nvPr/>
+        </p:nvCxnSpPr>
+        <p:spPr>
+          <a:xfrm flipV="1">
+            <a:off x="8264835" y="3182441"/>
+            <a:ext cx="641133" cy="1"/>
+          </a:xfrm>
+          <a:prstGeom prst="straightConnector1">
+            <a:avLst/>
+          </a:prstGeom>
+          <a:ln>
+            <a:tailEnd type="triangle"/>
+          </a:ln>
+          <a:effectLst>
+            <a:outerShdw blurRad="50800" dist="38100" dir="2700000" algn="tl" rotWithShape="0">
+              <a:prstClr val="black">
+                <a:alpha val="40000"/>
+              </a:prstClr>
+            </a:outerShdw>
+          </a:effectLst>
+        </p:spPr>
+        <p:style>
+          <a:lnRef idx="3">
+            <a:schemeClr val="accent2"/>
+          </a:lnRef>
+          <a:fillRef idx="0">
+            <a:schemeClr val="accent2"/>
+          </a:fillRef>
+          <a:effectRef idx="2">
+            <a:schemeClr val="accent2"/>
+          </a:effectRef>
+          <a:fontRef idx="minor">
+            <a:schemeClr val="tx1"/>
+          </a:fontRef>
+        </p:style>
+      </p:cxnSp>
+      <p:cxnSp>
+        <p:nvCxnSpPr>
+          <p:cNvPr id="147" name="Straight Arrow Connector 50">
+            <a:extLst>
+              <a:ext uri="{FF2B5EF4-FFF2-40B4-BE49-F238E27FC236}">
+                <a16:creationId xmlns:a16="http://schemas.microsoft.com/office/drawing/2014/main" id="{B22C6798-F93E-4321-92CB-B155FF511EC5}"/>
+              </a:ext>
+            </a:extLst>
+          </p:cNvPr>
+          <p:cNvCxnSpPr>
+            <a:cxnSpLocks/>
+          </p:cNvCxnSpPr>
+          <p:nvPr/>
+        </p:nvCxnSpPr>
+        <p:spPr>
+          <a:xfrm flipV="1">
+            <a:off x="8273313" y="4129756"/>
+            <a:ext cx="641133" cy="1"/>
+          </a:xfrm>
+          <a:prstGeom prst="straightConnector1">
+            <a:avLst/>
+          </a:prstGeom>
+          <a:ln>
+            <a:tailEnd type="triangle"/>
+          </a:ln>
+          <a:effectLst>
+            <a:outerShdw blurRad="50800" dist="38100" dir="2700000" algn="tl" rotWithShape="0">
+              <a:prstClr val="black">
+                <a:alpha val="40000"/>
+              </a:prstClr>
+            </a:outerShdw>
+          </a:effectLst>
+        </p:spPr>
+        <p:style>
+          <a:lnRef idx="3">
+            <a:schemeClr val="accent2"/>
+          </a:lnRef>
+          <a:fillRef idx="0">
+            <a:schemeClr val="accent2"/>
+          </a:fillRef>
+          <a:effectRef idx="2">
+            <a:schemeClr val="accent2"/>
+          </a:effectRef>
+          <a:fontRef idx="minor">
+            <a:schemeClr val="tx1"/>
+          </a:fontRef>
+        </p:style>
+      </p:cxnSp>
+      <p:cxnSp>
+        <p:nvCxnSpPr>
+          <p:cNvPr id="150" name="Straight Arrow Connector 50">
+            <a:extLst>
+              <a:ext uri="{FF2B5EF4-FFF2-40B4-BE49-F238E27FC236}">
+                <a16:creationId xmlns:a16="http://schemas.microsoft.com/office/drawing/2014/main" id="{97E5A6D1-902D-479D-A4DB-B11C79AD826C}"/>
+              </a:ext>
+            </a:extLst>
+          </p:cNvPr>
+          <p:cNvCxnSpPr>
+            <a:cxnSpLocks/>
+          </p:cNvCxnSpPr>
+          <p:nvPr/>
+        </p:nvCxnSpPr>
+        <p:spPr>
+          <a:xfrm flipH="1">
+            <a:off x="4162602" y="4998625"/>
+            <a:ext cx="8624" cy="451723"/>
+          </a:xfrm>
+          <a:prstGeom prst="straightConnector1">
+            <a:avLst/>
+          </a:prstGeom>
+          <a:ln>
+            <a:tailEnd type="triangle"/>
+          </a:ln>
+          <a:effectLst>
+            <a:outerShdw blurRad="50800" dist="38100" dir="2700000" algn="tl" rotWithShape="0">
+              <a:prstClr val="black">
+                <a:alpha val="40000"/>
+              </a:prstClr>
+            </a:outerShdw>
+          </a:effectLst>
+        </p:spPr>
+        <p:style>
+          <a:lnRef idx="3">
+            <a:schemeClr val="accent2"/>
+          </a:lnRef>
+          <a:fillRef idx="0">
+            <a:schemeClr val="accent2"/>
+          </a:fillRef>
+          <a:effectRef idx="2">
+            <a:schemeClr val="accent2"/>
+          </a:effectRef>
+          <a:fontRef idx="minor">
+            <a:schemeClr val="tx1"/>
+          </a:fontRef>
+        </p:style>
+      </p:cxnSp>
+      <p:cxnSp>
+        <p:nvCxnSpPr>
+          <p:cNvPr id="161" name="Kobling: vinkel 160">
+            <a:extLst>
+              <a:ext uri="{FF2B5EF4-FFF2-40B4-BE49-F238E27FC236}">
+                <a16:creationId xmlns:a16="http://schemas.microsoft.com/office/drawing/2014/main" id="{71EF5385-5A1B-4ED9-A394-E3CEB5E74BB9}"/>
+              </a:ext>
+            </a:extLst>
+          </p:cNvPr>
+          <p:cNvCxnSpPr>
+            <a:cxnSpLocks/>
+          </p:cNvCxnSpPr>
+          <p:nvPr/>
+        </p:nvCxnSpPr>
+        <p:spPr>
+          <a:xfrm>
+            <a:off x="6432138" y="3550540"/>
+            <a:ext cx="1151294" cy="591576"/>
+          </a:xfrm>
+          <a:prstGeom prst="bentConnector3">
+            <a:avLst>
+              <a:gd name="adj1" fmla="val 1022"/>
+            </a:avLst>
+          </a:prstGeom>
+          <a:ln>
+            <a:tailEnd type="triangle"/>
+          </a:ln>
+          <a:effectLst>
+            <a:outerShdw blurRad="50800" dist="50800" dir="2700000" algn="ctr" rotWithShape="0">
+              <a:schemeClr val="tx1">
+                <a:alpha val="40000"/>
+              </a:schemeClr>
+            </a:outerShdw>
+          </a:effectLst>
+        </p:spPr>
+        <p:style>
+          <a:lnRef idx="3">
+            <a:schemeClr val="accent2"/>
+          </a:lnRef>
+          <a:fillRef idx="0">
+            <a:schemeClr val="accent2"/>
+          </a:fillRef>
+          <a:effectRef idx="2">
+            <a:schemeClr val="accent2"/>
+          </a:effectRef>
+          <a:fontRef idx="minor">
+            <a:schemeClr val="tx1"/>
+          </a:fontRef>
+        </p:style>
+      </p:cxnSp>
+      <p:cxnSp>
+        <p:nvCxnSpPr>
+          <p:cNvPr id="167" name="Kobling: vinkel 166">
+            <a:extLst>
+              <a:ext uri="{FF2B5EF4-FFF2-40B4-BE49-F238E27FC236}">
+                <a16:creationId xmlns:a16="http://schemas.microsoft.com/office/drawing/2014/main" id="{4138571B-8113-45E2-A584-F2D76ED6B01A}"/>
+              </a:ext>
+            </a:extLst>
+          </p:cNvPr>
+          <p:cNvCxnSpPr>
+            <a:cxnSpLocks/>
+          </p:cNvCxnSpPr>
+          <p:nvPr/>
+        </p:nvCxnSpPr>
+        <p:spPr>
+          <a:xfrm flipV="1">
+            <a:off x="6443768" y="2305536"/>
+            <a:ext cx="1076131" cy="336341"/>
+          </a:xfrm>
+          <a:prstGeom prst="bentConnector3">
+            <a:avLst>
+              <a:gd name="adj1" fmla="val 906"/>
+            </a:avLst>
+          </a:prstGeom>
+          <a:ln>
+            <a:tailEnd type="triangle"/>
+          </a:ln>
+          <a:effectLst>
+            <a:outerShdw blurRad="50800" dist="50800" dir="2700000" algn="ctr" rotWithShape="0">
+              <a:schemeClr val="tx1">
+                <a:alpha val="40000"/>
+              </a:schemeClr>
+            </a:outerShdw>
+          </a:effectLst>
+        </p:spPr>
+        <p:style>
+          <a:lnRef idx="3">
+            <a:schemeClr val="accent2"/>
+          </a:lnRef>
+          <a:fillRef idx="0">
+            <a:schemeClr val="accent2"/>
+          </a:fillRef>
+          <a:effectRef idx="2">
+            <a:schemeClr val="accent2"/>
+          </a:effectRef>
+          <a:fontRef idx="minor">
+            <a:schemeClr val="tx1"/>
+          </a:fontRef>
+        </p:style>
+      </p:cxnSp>
+    </p:spTree>
+    <p:extLst>
+      <p:ext uri="{BB962C8B-B14F-4D97-AF65-F5344CB8AC3E}">
+        <p14:creationId xmlns:p14="http://schemas.microsoft.com/office/powerpoint/2010/main" val="2695255064"/>
       </p:ext>
     </p:extLst>
   </p:cSld>

</xml_diff>